<commit_message>
updated dokumentation and pp
</commit_message>
<xml_diff>
--- a/MachineLearning.pptx
+++ b/MachineLearning.pptx
@@ -5,7 +5,7 @@
     <p:sldMasterId id="2147483648" r:id="rId4"/>
   </p:sldMasterIdLst>
   <p:notesMasterIdLst>
-    <p:notesMasterId r:id="rId67"/>
+    <p:notesMasterId r:id="rId68"/>
   </p:notesMasterIdLst>
   <p:sldIdLst>
     <p:sldId id="260" r:id="rId5"/>
@@ -52,24 +52,25 @@
     <p:sldId id="301" r:id="rId46"/>
     <p:sldId id="302" r:id="rId47"/>
     <p:sldId id="303" r:id="rId48"/>
-    <p:sldId id="304" r:id="rId49"/>
-    <p:sldId id="305" r:id="rId50"/>
-    <p:sldId id="306" r:id="rId51"/>
-    <p:sldId id="307" r:id="rId52"/>
-    <p:sldId id="308" r:id="rId53"/>
-    <p:sldId id="309" r:id="rId54"/>
-    <p:sldId id="310" r:id="rId55"/>
-    <p:sldId id="311" r:id="rId56"/>
-    <p:sldId id="312" r:id="rId57"/>
-    <p:sldId id="313" r:id="rId58"/>
-    <p:sldId id="314" r:id="rId59"/>
-    <p:sldId id="315" r:id="rId60"/>
-    <p:sldId id="316" r:id="rId61"/>
-    <p:sldId id="317" r:id="rId62"/>
-    <p:sldId id="318" r:id="rId63"/>
-    <p:sldId id="320" r:id="rId64"/>
-    <p:sldId id="321" r:id="rId65"/>
-    <p:sldId id="322" r:id="rId66"/>
+    <p:sldId id="323" r:id="rId49"/>
+    <p:sldId id="304" r:id="rId50"/>
+    <p:sldId id="305" r:id="rId51"/>
+    <p:sldId id="306" r:id="rId52"/>
+    <p:sldId id="307" r:id="rId53"/>
+    <p:sldId id="308" r:id="rId54"/>
+    <p:sldId id="309" r:id="rId55"/>
+    <p:sldId id="310" r:id="rId56"/>
+    <p:sldId id="311" r:id="rId57"/>
+    <p:sldId id="312" r:id="rId58"/>
+    <p:sldId id="313" r:id="rId59"/>
+    <p:sldId id="314" r:id="rId60"/>
+    <p:sldId id="315" r:id="rId61"/>
+    <p:sldId id="316" r:id="rId62"/>
+    <p:sldId id="317" r:id="rId63"/>
+    <p:sldId id="318" r:id="rId64"/>
+    <p:sldId id="320" r:id="rId65"/>
+    <p:sldId id="321" r:id="rId66"/>
+    <p:sldId id="322" r:id="rId67"/>
   </p:sldIdLst>
   <p:sldSz cx="9144000" cy="5143500" type="screen16x9"/>
   <p:notesSz cx="6858000" cy="9144000"/>
@@ -217,6 +218,7 @@
             <p14:sldId id="301"/>
             <p14:sldId id="302"/>
             <p14:sldId id="303"/>
+            <p14:sldId id="323"/>
             <p14:sldId id="304"/>
             <p14:sldId id="305"/>
             <p14:sldId id="306"/>
@@ -339,7 +341,7 @@
           <a:p>
             <a:fld id="{4B76ECE7-AC26-4852-B11E-08111269906F}" type="datetimeFigureOut">
               <a:rPr lang="en-US" smtClean="0"/>
-              <a:t>12/13/2021</a:t>
+              <a:t>12/21/2021</a:t>
             </a:fld>
             <a:endParaRPr lang="en-US"/>
           </a:p>
@@ -9179,10 +9181,10 @@
       </p:sp>
       <p:pic>
         <p:nvPicPr>
-          <p:cNvPr id="13" name="Grafik 12" descr="Ein Bild, das Text enthält.&#10;&#10;Automatisch generierte Beschreibung">
-            <a:extLst>
-              <a:ext uri="{FF2B5EF4-FFF2-40B4-BE49-F238E27FC236}">
-                <a16:creationId xmlns:a16="http://schemas.microsoft.com/office/drawing/2014/main" id="{5C840D60-8C4F-41FB-86D8-5F66F26B0A0A}"/>
+          <p:cNvPr id="4" name="Grafik 3" descr="Ein Bild, das Text enthält.&#10;&#10;Automatisch generierte Beschreibung">
+            <a:extLst>
+              <a:ext uri="{FF2B5EF4-FFF2-40B4-BE49-F238E27FC236}">
+                <a16:creationId xmlns:a16="http://schemas.microsoft.com/office/drawing/2014/main" id="{E91697C9-B07C-434E-B3EB-BBCEBA24C83A}"/>
               </a:ext>
             </a:extLst>
           </p:cNvPr>
@@ -9199,7 +9201,7 @@
         </p:blipFill>
         <p:spPr>
           <a:xfrm>
-            <a:off x="3688980" y="1189956"/>
+            <a:off x="3779912" y="1074847"/>
             <a:ext cx="5485714" cy="3657143"/>
           </a:xfrm>
           <a:prstGeom prst="rect">
@@ -9411,6 +9413,19 @@
           </a:bodyPr>
           <a:lstStyle/>
           <a:p>
+            <a:endParaRPr lang="de-DE" dirty="0"/>
+          </a:p>
+          <a:p>
+            <a:pPr marL="342900" indent="-342900">
+              <a:buFont typeface="Arial" panose="020B0604020202020204" pitchFamily="34" charset="0"/>
+              <a:buChar char="•"/>
+            </a:pPr>
+            <a:r>
+              <a:rPr lang="de-DE" dirty="0"/>
+              <a:t>Auch hier bestätigt sich:</a:t>
+            </a:r>
+          </a:p>
+          <a:p>
             <a:pPr marL="342900" indent="-342900">
               <a:buFont typeface="Arial" panose="020B0604020202020204" pitchFamily="34" charset="0"/>
               <a:buChar char="•"/>
@@ -9425,23 +9440,6 @@
             <a:endParaRPr lang="de-DE" dirty="0"/>
           </a:p>
           <a:p>
-            <a:pPr marL="342900" indent="-342900">
-              <a:buFont typeface="Arial" panose="020B0604020202020204" pitchFamily="34" charset="0"/>
-              <a:buChar char="•"/>
-            </a:pPr>
-            <a:r>
-              <a:rPr lang="de-DE" dirty="0"/>
-              <a:t>Auch hier bestätigt sich:</a:t>
-            </a:r>
-          </a:p>
-          <a:p>
-            <a:pPr marL="342900" indent="-342900">
-              <a:buFont typeface="Arial" panose="020B0604020202020204" pitchFamily="34" charset="0"/>
-              <a:buChar char="•"/>
-            </a:pPr>
-            <a:endParaRPr lang="de-DE" dirty="0"/>
-          </a:p>
-          <a:p>
             <a:pPr algn="ctr"/>
             <a:r>
               <a:rPr lang="de-DE" b="1" dirty="0"/>
@@ -9452,10 +9450,10 @@
       </p:sp>
       <p:pic>
         <p:nvPicPr>
-          <p:cNvPr id="4" name="Grafik 3">
-            <a:extLst>
-              <a:ext uri="{FF2B5EF4-FFF2-40B4-BE49-F238E27FC236}">
-                <a16:creationId xmlns:a16="http://schemas.microsoft.com/office/drawing/2014/main" id="{0AA13725-9E1E-404A-8060-CCA5B7ADFA27}"/>
+          <p:cNvPr id="10" name="Grafik 9">
+            <a:extLst>
+              <a:ext uri="{FF2B5EF4-FFF2-40B4-BE49-F238E27FC236}">
+                <a16:creationId xmlns:a16="http://schemas.microsoft.com/office/drawing/2014/main" id="{BF70FAAB-FF2F-46A5-A953-73E35D9DF202}"/>
               </a:ext>
             </a:extLst>
           </p:cNvPr>
@@ -9472,7 +9470,7 @@
         </p:blipFill>
         <p:spPr>
           <a:xfrm>
-            <a:off x="3677264" y="1203598"/>
+            <a:off x="3779912" y="1126581"/>
             <a:ext cx="5485714" cy="3657143"/>
           </a:xfrm>
           <a:prstGeom prst="rect">
@@ -16663,196 +16661,10 @@
       </p:grpSpPr>
       <p:sp>
         <p:nvSpPr>
-          <p:cNvPr id="2" name="Textplatzhalter 1">
-            <a:extLst>
-              <a:ext uri="{FF2B5EF4-FFF2-40B4-BE49-F238E27FC236}">
-                <a16:creationId xmlns:a16="http://schemas.microsoft.com/office/drawing/2014/main" id="{E0153DE4-E40A-4D41-9821-8E8ECEC80A7E}"/>
-              </a:ext>
-            </a:extLst>
-          </p:cNvPr>
-          <p:cNvSpPr>
-            <a:spLocks noGrp="1"/>
-          </p:cNvSpPr>
-          <p:nvPr>
-            <p:ph type="body" sz="quarter" idx="13"/>
-          </p:nvPr>
-        </p:nvSpPr>
-        <p:spPr/>
-        <p:txBody>
-          <a:bodyPr/>
-          <a:lstStyle/>
-          <a:p>
-            <a:r>
-              <a:rPr lang="de-DE" dirty="0"/>
-              <a:t>Dr12 </a:t>
-            </a:r>
-            <a:r>
-              <a:rPr lang="de-DE" dirty="0" err="1"/>
-              <a:t>science</a:t>
-            </a:r>
-            <a:r>
-              <a:rPr lang="de-DE" dirty="0"/>
-              <a:t> </a:t>
-            </a:r>
-            <a:r>
-              <a:rPr lang="de-DE" dirty="0" err="1"/>
-              <a:t>archieve</a:t>
-            </a:r>
-            <a:r>
-              <a:rPr lang="de-DE" dirty="0"/>
-              <a:t> </a:t>
-            </a:r>
-            <a:r>
-              <a:rPr lang="de-DE" dirty="0" err="1"/>
-              <a:t>server</a:t>
-            </a:r>
-            <a:r>
-              <a:rPr lang="de-DE" dirty="0"/>
-              <a:t> (</a:t>
-            </a:r>
-            <a:r>
-              <a:rPr lang="de-DE" dirty="0" err="1"/>
-              <a:t>sAS</a:t>
-            </a:r>
-            <a:r>
-              <a:rPr lang="de-DE" dirty="0"/>
-              <a:t>)</a:t>
-            </a:r>
-          </a:p>
-        </p:txBody>
-      </p:sp>
-      <p:sp>
-        <p:nvSpPr>
-          <p:cNvPr id="3" name="Textplatzhalter 2">
-            <a:extLst>
-              <a:ext uri="{FF2B5EF4-FFF2-40B4-BE49-F238E27FC236}">
-                <a16:creationId xmlns:a16="http://schemas.microsoft.com/office/drawing/2014/main" id="{73B90F09-2712-4F3C-9557-150E133BC0AC}"/>
-              </a:ext>
-            </a:extLst>
-          </p:cNvPr>
-          <p:cNvSpPr>
-            <a:spLocks noGrp="1"/>
-          </p:cNvSpPr>
-          <p:nvPr>
-            <p:ph type="body" sz="quarter" idx="14"/>
-          </p:nvPr>
-        </p:nvSpPr>
-        <p:spPr>
-          <a:xfrm>
-            <a:off x="214770" y="1779662"/>
-            <a:ext cx="7957630" cy="3168352"/>
-          </a:xfrm>
-        </p:spPr>
-        <p:txBody>
-          <a:bodyPr/>
-          <a:lstStyle/>
-          <a:p>
-            <a:pPr marL="342900" indent="-342900">
-              <a:buFont typeface="Arial" panose="020B0604020202020204" pitchFamily="34" charset="0"/>
-              <a:buChar char="•"/>
-            </a:pPr>
-            <a:r>
-              <a:rPr lang="de-DE" dirty="0"/>
-              <a:t>Zugriff über die </a:t>
-            </a:r>
-            <a:r>
-              <a:rPr lang="de-DE" dirty="0" err="1">
-                <a:hlinkClick r:id="rId2"/>
-              </a:rPr>
-              <a:t>Advanced</a:t>
-            </a:r>
-            <a:r>
-              <a:rPr lang="de-DE" dirty="0">
-                <a:hlinkClick r:id="rId2"/>
-              </a:rPr>
-              <a:t> Optical </a:t>
-            </a:r>
-            <a:r>
-              <a:rPr lang="de-DE" dirty="0" err="1">
-                <a:hlinkClick r:id="rId2"/>
-              </a:rPr>
-              <a:t>Spectra</a:t>
-            </a:r>
-            <a:r>
-              <a:rPr lang="de-DE" dirty="0">
-                <a:hlinkClick r:id="rId2"/>
-              </a:rPr>
-              <a:t> Search</a:t>
-            </a:r>
-            <a:endParaRPr lang="de-DE" dirty="0"/>
-          </a:p>
-          <a:p>
-            <a:pPr marL="342900" indent="-342900">
-              <a:buFont typeface="Arial" panose="020B0604020202020204" pitchFamily="34" charset="0"/>
-              <a:buChar char="•"/>
-            </a:pPr>
-            <a:r>
-              <a:rPr lang="de-DE" dirty="0"/>
-              <a:t>Über eine Suchfunktionen können Spektren gefunden und heruntergeladen werden</a:t>
-            </a:r>
-          </a:p>
-          <a:p>
-            <a:pPr marL="342900" indent="-342900">
-              <a:buFont typeface="Arial" panose="020B0604020202020204" pitchFamily="34" charset="0"/>
-              <a:buChar char="•"/>
-            </a:pPr>
-            <a:r>
-              <a:rPr lang="de-DE" dirty="0"/>
-              <a:t>In verschiedenen Reitern können die wichtigsten Parameter eingegrenzt werden, zum Beispiel:</a:t>
-            </a:r>
-          </a:p>
-          <a:p>
-            <a:r>
-              <a:rPr lang="de-DE" dirty="0"/>
-              <a:t>	</a:t>
-            </a:r>
-            <a:r>
-              <a:rPr lang="de-DE" sz="1800" dirty="0"/>
-              <a:t>Platten-Identifikationsnummer (Plate ID)</a:t>
-            </a:r>
-          </a:p>
-          <a:p>
-            <a:r>
-              <a:rPr lang="de-DE" sz="1800" dirty="0"/>
-              <a:t>	Julianische Datum (MJD)</a:t>
-            </a:r>
-          </a:p>
-          <a:p>
-            <a:r>
-              <a:rPr lang="de-DE" sz="1800" dirty="0"/>
-              <a:t>	Platten-Faser (</a:t>
-            </a:r>
-            <a:r>
-              <a:rPr lang="de-DE" sz="1800" dirty="0" err="1"/>
-              <a:t>fiber</a:t>
-            </a:r>
-            <a:r>
-              <a:rPr lang="de-DE" sz="1800" dirty="0"/>
-              <a:t>)</a:t>
-            </a:r>
-          </a:p>
-          <a:p>
-            <a:r>
-              <a:rPr lang="de-DE" sz="1800" dirty="0"/>
-              <a:t>	Identifikationsnummer des Objekts (</a:t>
-            </a:r>
-            <a:r>
-              <a:rPr lang="de-DE" sz="1800" dirty="0" err="1"/>
-              <a:t>Thing_ID</a:t>
-            </a:r>
-            <a:r>
-              <a:rPr lang="de-DE" sz="1800" dirty="0"/>
-              <a:t>)</a:t>
-            </a:r>
-          </a:p>
-        </p:txBody>
-      </p:sp>
-      <p:sp>
-        <p:nvSpPr>
           <p:cNvPr id="5" name="Titel 4">
             <a:extLst>
               <a:ext uri="{FF2B5EF4-FFF2-40B4-BE49-F238E27FC236}">
-                <a16:creationId xmlns:a16="http://schemas.microsoft.com/office/drawing/2014/main" id="{E31F5CD4-F489-4A5E-9935-C88732CAAAFD}"/>
+                <a16:creationId xmlns:a16="http://schemas.microsoft.com/office/drawing/2014/main" id="{34DB5D6B-7A7B-4227-A708-7F601B49089C}"/>
               </a:ext>
             </a:extLst>
           </p:cNvPr>
@@ -16893,7 +16705,7 @@
           <p:cNvPr id="6" name="Datumsplatzhalter 5">
             <a:extLst>
               <a:ext uri="{FF2B5EF4-FFF2-40B4-BE49-F238E27FC236}">
-                <a16:creationId xmlns:a16="http://schemas.microsoft.com/office/drawing/2014/main" id="{B6462FF8-45C9-4CD0-ACEC-B0E66CEECCB5}"/>
+                <a16:creationId xmlns:a16="http://schemas.microsoft.com/office/drawing/2014/main" id="{DC7DC701-A580-40EE-90E6-9DD13B9AACAC}"/>
               </a:ext>
             </a:extLst>
           </p:cNvPr>
@@ -16921,7 +16733,7 @@
           <p:cNvPr id="7" name="Fußzeilenplatzhalter 6">
             <a:extLst>
               <a:ext uri="{FF2B5EF4-FFF2-40B4-BE49-F238E27FC236}">
-                <a16:creationId xmlns:a16="http://schemas.microsoft.com/office/drawing/2014/main" id="{7A7B367A-8847-4B51-827F-D0249922448F}"/>
+                <a16:creationId xmlns:a16="http://schemas.microsoft.com/office/drawing/2014/main" id="{14A906BE-7F6F-41E7-A8FD-37D67ED00B7F}"/>
               </a:ext>
             </a:extLst>
           </p:cNvPr>
@@ -16938,7 +16750,7 @@
           <a:lstStyle/>
           <a:p>
             <a:r>
-              <a:rPr lang="de-DE" dirty="0">
+              <a:rPr lang="de-DE">
                 <a:latin typeface="TheSans UHH Bold Caps"/>
                 <a:cs typeface="TheSans UHH Bold Caps"/>
               </a:rPr>
@@ -16953,7 +16765,7 @@
           <p:cNvPr id="8" name="Foliennummernplatzhalter 7">
             <a:extLst>
               <a:ext uri="{FF2B5EF4-FFF2-40B4-BE49-F238E27FC236}">
-                <a16:creationId xmlns:a16="http://schemas.microsoft.com/office/drawing/2014/main" id="{F9EE2CBC-2785-4DA2-82FF-C2FFEA17D854}"/>
+                <a16:creationId xmlns:a16="http://schemas.microsoft.com/office/drawing/2014/main" id="{80B31DA2-5E93-4D4A-BCC3-A97DC1130E25}"/>
               </a:ext>
             </a:extLst>
           </p:cNvPr>
@@ -16978,10 +16790,178 @@
           </a:p>
         </p:txBody>
       </p:sp>
+      <p:pic>
+        <p:nvPicPr>
+          <p:cNvPr id="1028" name="Picture 4">
+            <a:extLst>
+              <a:ext uri="{FF2B5EF4-FFF2-40B4-BE49-F238E27FC236}">
+                <a16:creationId xmlns:a16="http://schemas.microsoft.com/office/drawing/2014/main" id="{F5AF7B40-4F8E-4FDD-91C0-66CB44A36A80}"/>
+              </a:ext>
+            </a:extLst>
+          </p:cNvPr>
+          <p:cNvPicPr>
+            <a:picLocks noChangeAspect="1" noChangeArrowheads="1"/>
+          </p:cNvPicPr>
+          <p:nvPr/>
+        </p:nvPicPr>
+        <p:blipFill>
+          <a:blip r:embed="rId2">
+            <a:extLst>
+              <a:ext uri="{28A0092B-C50C-407E-A947-70E740481C1C}">
+                <a14:useLocalDpi xmlns:a14="http://schemas.microsoft.com/office/drawing/2010/main" val="0"/>
+              </a:ext>
+            </a:extLst>
+          </a:blip>
+          <a:srcRect/>
+          <a:stretch>
+            <a:fillRect/>
+          </a:stretch>
+        </p:blipFill>
+        <p:spPr bwMode="auto">
+          <a:xfrm>
+            <a:off x="395536" y="1460326"/>
+            <a:ext cx="3743325" cy="2667000"/>
+          </a:xfrm>
+          <a:prstGeom prst="rect">
+            <a:avLst/>
+          </a:prstGeom>
+          <a:noFill/>
+          <a:extLst>
+            <a:ext uri="{909E8E84-426E-40DD-AFC4-6F175D3DCCD1}">
+              <a14:hiddenFill xmlns:a14="http://schemas.microsoft.com/office/drawing/2010/main">
+                <a:solidFill>
+                  <a:srgbClr val="FFFFFF"/>
+                </a:solidFill>
+              </a14:hiddenFill>
+            </a:ext>
+          </a:extLst>
+        </p:spPr>
+      </p:pic>
+      <p:pic>
+        <p:nvPicPr>
+          <p:cNvPr id="1032" name="Picture 8">
+            <a:extLst>
+              <a:ext uri="{FF2B5EF4-FFF2-40B4-BE49-F238E27FC236}">
+                <a16:creationId xmlns:a16="http://schemas.microsoft.com/office/drawing/2014/main" id="{56C14F05-3B59-435B-BB7A-ECE60253E376}"/>
+              </a:ext>
+            </a:extLst>
+          </p:cNvPr>
+          <p:cNvPicPr>
+            <a:picLocks noChangeAspect="1" noChangeArrowheads="1"/>
+          </p:cNvPicPr>
+          <p:nvPr/>
+        </p:nvPicPr>
+        <p:blipFill>
+          <a:blip r:embed="rId3">
+            <a:extLst>
+              <a:ext uri="{28A0092B-C50C-407E-A947-70E740481C1C}">
+                <a14:useLocalDpi xmlns:a14="http://schemas.microsoft.com/office/drawing/2010/main" val="0"/>
+              </a:ext>
+            </a:extLst>
+          </a:blip>
+          <a:srcRect/>
+          <a:stretch>
+            <a:fillRect/>
+          </a:stretch>
+        </p:blipFill>
+        <p:spPr bwMode="auto">
+          <a:xfrm>
+            <a:off x="4860032" y="1463799"/>
+            <a:ext cx="3771900" cy="2667000"/>
+          </a:xfrm>
+          <a:prstGeom prst="rect">
+            <a:avLst/>
+          </a:prstGeom>
+          <a:noFill/>
+          <a:extLst>
+            <a:ext uri="{909E8E84-426E-40DD-AFC4-6F175D3DCCD1}">
+              <a14:hiddenFill xmlns:a14="http://schemas.microsoft.com/office/drawing/2010/main">
+                <a:solidFill>
+                  <a:srgbClr val="FFFFFF"/>
+                </a:solidFill>
+              </a14:hiddenFill>
+            </a:ext>
+          </a:extLst>
+        </p:spPr>
+      </p:pic>
+      <p:sp>
+        <p:nvSpPr>
+          <p:cNvPr id="9" name="Textfeld 8">
+            <a:extLst>
+              <a:ext uri="{FF2B5EF4-FFF2-40B4-BE49-F238E27FC236}">
+                <a16:creationId xmlns:a16="http://schemas.microsoft.com/office/drawing/2014/main" id="{BC839673-0D8C-4854-8C4C-C3D0DAC0EE24}"/>
+              </a:ext>
+            </a:extLst>
+          </p:cNvPr>
+          <p:cNvSpPr txBox="1"/>
+          <p:nvPr/>
+        </p:nvSpPr>
+        <p:spPr>
+          <a:xfrm>
+            <a:off x="1763688" y="4119624"/>
+            <a:ext cx="1518364" cy="338554"/>
+          </a:xfrm>
+          <a:prstGeom prst="rect">
+            <a:avLst/>
+          </a:prstGeom>
+          <a:noFill/>
+        </p:spPr>
+        <p:txBody>
+          <a:bodyPr wrap="none" rtlCol="0">
+            <a:spAutoFit/>
+          </a:bodyPr>
+          <a:lstStyle/>
+          <a:p>
+            <a:r>
+              <a:rPr lang="de-DE" sz="1600" dirty="0">
+                <a:latin typeface="TheSans UHH" panose="020B0502050302020203" pitchFamily="34" charset="0"/>
+              </a:rPr>
+              <a:t>Klasse: Galaxie</a:t>
+            </a:r>
+          </a:p>
+        </p:txBody>
+      </p:sp>
+      <p:sp>
+        <p:nvSpPr>
+          <p:cNvPr id="14" name="Textfeld 13">
+            <a:extLst>
+              <a:ext uri="{FF2B5EF4-FFF2-40B4-BE49-F238E27FC236}">
+                <a16:creationId xmlns:a16="http://schemas.microsoft.com/office/drawing/2014/main" id="{8BD6F623-15D4-4E8F-AC54-37BED7582D4D}"/>
+              </a:ext>
+            </a:extLst>
+          </p:cNvPr>
+          <p:cNvSpPr txBox="1"/>
+          <p:nvPr/>
+        </p:nvSpPr>
+        <p:spPr>
+          <a:xfrm>
+            <a:off x="6300192" y="4130799"/>
+            <a:ext cx="1322798" cy="338554"/>
+          </a:xfrm>
+          <a:prstGeom prst="rect">
+            <a:avLst/>
+          </a:prstGeom>
+          <a:noFill/>
+        </p:spPr>
+        <p:txBody>
+          <a:bodyPr wrap="none" rtlCol="0">
+            <a:spAutoFit/>
+          </a:bodyPr>
+          <a:lstStyle/>
+          <a:p>
+            <a:r>
+              <a:rPr lang="de-DE" sz="1600" dirty="0">
+                <a:latin typeface="TheSans UHH" panose="020B0502050302020203" pitchFamily="34" charset="0"/>
+              </a:rPr>
+              <a:t>Klasse: Stern</a:t>
+            </a:r>
+          </a:p>
+        </p:txBody>
+      </p:sp>
     </p:spTree>
     <p:extLst>
       <p:ext uri="{BB962C8B-B14F-4D97-AF65-F5344CB8AC3E}">
-        <p14:creationId xmlns:p14="http://schemas.microsoft.com/office/powerpoint/2010/main" val="3766836284"/>
+        <p14:creationId xmlns:p14="http://schemas.microsoft.com/office/powerpoint/2010/main" val="1371482959"/>
       </p:ext>
     </p:extLst>
   </p:cSld>
@@ -17013,7 +16993,7 @@
           <p:cNvPr id="2" name="Textplatzhalter 1">
             <a:extLst>
               <a:ext uri="{FF2B5EF4-FFF2-40B4-BE49-F238E27FC236}">
-                <a16:creationId xmlns:a16="http://schemas.microsoft.com/office/drawing/2014/main" id="{373A6D3C-34EA-4692-B0A9-DC99C8CF6071}"/>
+                <a16:creationId xmlns:a16="http://schemas.microsoft.com/office/drawing/2014/main" id="{E0153DE4-E40A-4D41-9821-8E8ECEC80A7E}"/>
               </a:ext>
             </a:extLst>
           </p:cNvPr>
@@ -17031,13 +17011,40 @@
           <a:p>
             <a:r>
               <a:rPr lang="de-DE" dirty="0"/>
-              <a:t>Download vom </a:t>
+              <a:t>Dr12 </a:t>
             </a:r>
             <a:r>
               <a:rPr lang="de-DE" dirty="0" err="1"/>
-              <a:t>Skyserver</a:t>
-            </a:r>
-            <a:endParaRPr lang="de-DE" dirty="0"/>
+              <a:t>science</a:t>
+            </a:r>
+            <a:r>
+              <a:rPr lang="de-DE" dirty="0"/>
+              <a:t> </a:t>
+            </a:r>
+            <a:r>
+              <a:rPr lang="de-DE" dirty="0" err="1"/>
+              <a:t>archieve</a:t>
+            </a:r>
+            <a:r>
+              <a:rPr lang="de-DE" dirty="0"/>
+              <a:t> </a:t>
+            </a:r>
+            <a:r>
+              <a:rPr lang="de-DE" dirty="0" err="1"/>
+              <a:t>server</a:t>
+            </a:r>
+            <a:r>
+              <a:rPr lang="de-DE" dirty="0"/>
+              <a:t> (</a:t>
+            </a:r>
+            <a:r>
+              <a:rPr lang="de-DE" dirty="0" err="1"/>
+              <a:t>sAS</a:t>
+            </a:r>
+            <a:r>
+              <a:rPr lang="de-DE" dirty="0"/>
+              <a:t>)</a:t>
+            </a:r>
           </a:p>
         </p:txBody>
       </p:sp>
@@ -17046,7 +17053,7 @@
           <p:cNvPr id="3" name="Textplatzhalter 2">
             <a:extLst>
               <a:ext uri="{FF2B5EF4-FFF2-40B4-BE49-F238E27FC236}">
-                <a16:creationId xmlns:a16="http://schemas.microsoft.com/office/drawing/2014/main" id="{27EE4A62-2CAB-4AF3-972E-B4ED64A49260}"/>
+                <a16:creationId xmlns:a16="http://schemas.microsoft.com/office/drawing/2014/main" id="{73B90F09-2712-4F3C-9557-150E133BC0AC}"/>
               </a:ext>
             </a:extLst>
           </p:cNvPr>
@@ -17060,7 +17067,7 @@
         <p:spPr>
           <a:xfrm>
             <a:off x="214770" y="1779662"/>
-            <a:ext cx="8749718" cy="2880320"/>
+            <a:ext cx="7957630" cy="3168352"/>
           </a:xfrm>
         </p:spPr>
         <p:txBody>
@@ -17073,39 +17080,43 @@
             </a:pPr>
             <a:r>
               <a:rPr lang="de-DE" dirty="0"/>
-              <a:t>Der </a:t>
-            </a:r>
-            <a:r>
-              <a:rPr lang="de-DE" dirty="0" err="1"/>
-              <a:t>Skyserver</a:t>
-            </a:r>
-            <a:r>
-              <a:rPr lang="de-DE" dirty="0"/>
-              <a:t> bietet Zugriff auf alle öffentlich verfügbaren Daten (Spektren, </a:t>
-            </a:r>
-            <a:r>
-              <a:rPr lang="de-DE" dirty="0" err="1"/>
-              <a:t>fits-Dtaeien</a:t>
-            </a:r>
-            <a:r>
-              <a:rPr lang="de-DE" dirty="0"/>
-              <a:t>, </a:t>
-            </a:r>
-            <a:r>
-              <a:rPr lang="de-DE" dirty="0" err="1"/>
-              <a:t>jpg</a:t>
-            </a:r>
-            <a:r>
-              <a:rPr lang="de-DE" dirty="0"/>
-              <a:t>-Bilder, usw.)</a:t>
-            </a:r>
+              <a:t>Zugriff über die </a:t>
+            </a:r>
+            <a:r>
+              <a:rPr lang="de-DE" dirty="0" err="1">
+                <a:hlinkClick r:id="rId2"/>
+              </a:rPr>
+              <a:t>Advanced</a:t>
+            </a:r>
+            <a:r>
+              <a:rPr lang="de-DE" dirty="0">
+                <a:hlinkClick r:id="rId2"/>
+              </a:rPr>
+              <a:t> Optical </a:t>
+            </a:r>
+            <a:r>
+              <a:rPr lang="de-DE" dirty="0" err="1">
+                <a:hlinkClick r:id="rId2"/>
+              </a:rPr>
+              <a:t>Spectra</a:t>
+            </a:r>
+            <a:r>
+              <a:rPr lang="de-DE" dirty="0">
+                <a:hlinkClick r:id="rId2"/>
+              </a:rPr>
+              <a:t> Search</a:t>
+            </a:r>
+            <a:endParaRPr lang="de-DE" dirty="0"/>
           </a:p>
           <a:p>
             <a:pPr marL="342900" indent="-342900">
               <a:buFont typeface="Arial" panose="020B0604020202020204" pitchFamily="34" charset="0"/>
               <a:buChar char="•"/>
             </a:pPr>
-            <a:endParaRPr lang="de-DE" dirty="0"/>
+            <a:r>
+              <a:rPr lang="de-DE" dirty="0"/>
+              <a:t>Über eine Suchfunktionen können Spektren gefunden und heruntergeladen werden</a:t>
+            </a:r>
           </a:p>
           <a:p>
             <a:pPr marL="342900" indent="-342900">
@@ -17114,59 +17125,51 @@
             </a:pPr>
             <a:r>
               <a:rPr lang="de-DE" dirty="0"/>
-              <a:t>Zugriff </a:t>
-            </a:r>
-            <a:r>
-              <a:rPr lang="de-DE" dirty="0" err="1"/>
-              <a:t>bsw</a:t>
-            </a:r>
-            <a:r>
-              <a:rPr lang="de-DE" dirty="0"/>
-              <a:t>. über das </a:t>
-            </a:r>
-            <a:r>
-              <a:rPr lang="de-DE" dirty="0">
-                <a:hlinkClick r:id="rId2"/>
-              </a:rPr>
-              <a:t>Navigations-Tool</a:t>
-            </a:r>
-            <a:r>
-              <a:rPr lang="de-DE" dirty="0"/>
-              <a:t> oder eine </a:t>
-            </a:r>
-            <a:r>
-              <a:rPr lang="de-DE" dirty="0">
-                <a:hlinkClick r:id="rId3"/>
-              </a:rPr>
-              <a:t>SQL-Suche</a:t>
-            </a:r>
-            <a:endParaRPr lang="de-DE" dirty="0"/>
-          </a:p>
-          <a:p>
-            <a:pPr marL="342900" indent="-342900">
-              <a:buFont typeface="Arial" panose="020B0604020202020204" pitchFamily="34" charset="0"/>
-              <a:buChar char="•"/>
-            </a:pPr>
-            <a:endParaRPr lang="de-DE" dirty="0"/>
-          </a:p>
-          <a:p>
-            <a:pPr marL="342900" indent="-342900">
-              <a:buFont typeface="Arial" panose="020B0604020202020204" pitchFamily="34" charset="0"/>
-              <a:buChar char="•"/>
-            </a:pPr>
-            <a:r>
-              <a:rPr lang="de-DE" dirty="0"/>
-              <a:t>Der </a:t>
-            </a:r>
-            <a:r>
-              <a:rPr lang="de-DE" dirty="0">
-                <a:hlinkClick r:id="rId4"/>
-              </a:rPr>
-              <a:t>Schema-Browser</a:t>
-            </a:r>
-            <a:r>
-              <a:rPr lang="de-DE" dirty="0"/>
-              <a:t> listet alle durchsuchbaren Tabellen auf</a:t>
+              <a:t>In verschiedenen Reitern können die wichtigsten Parameter eingegrenzt werden, zum Beispiel:</a:t>
+            </a:r>
+          </a:p>
+          <a:p>
+            <a:r>
+              <a:rPr lang="de-DE" dirty="0"/>
+              <a:t>	</a:t>
+            </a:r>
+            <a:r>
+              <a:rPr lang="de-DE" sz="1800" dirty="0"/>
+              <a:t>Platten-Identifikationsnummer (Plate ID)</a:t>
+            </a:r>
+          </a:p>
+          <a:p>
+            <a:r>
+              <a:rPr lang="de-DE" sz="1800" dirty="0"/>
+              <a:t>	Julianische Datum (MJD)</a:t>
+            </a:r>
+          </a:p>
+          <a:p>
+            <a:r>
+              <a:rPr lang="de-DE" sz="1800" dirty="0"/>
+              <a:t>	Platten-Faser (</a:t>
+            </a:r>
+            <a:r>
+              <a:rPr lang="de-DE" sz="1800" dirty="0" err="1"/>
+              <a:t>fiber</a:t>
+            </a:r>
+            <a:r>
+              <a:rPr lang="de-DE" sz="1800" dirty="0"/>
+              <a:t>)</a:t>
+            </a:r>
+          </a:p>
+          <a:p>
+            <a:r>
+              <a:rPr lang="de-DE" sz="1800" dirty="0"/>
+              <a:t>	Identifikationsnummer des Objekts (</a:t>
+            </a:r>
+            <a:r>
+              <a:rPr lang="de-DE" sz="1800" dirty="0" err="1"/>
+              <a:t>Thing_ID</a:t>
+            </a:r>
+            <a:r>
+              <a:rPr lang="de-DE" sz="1800" dirty="0"/>
+              <a:t>)</a:t>
             </a:r>
           </a:p>
         </p:txBody>
@@ -17176,7 +17179,7 @@
           <p:cNvPr id="5" name="Titel 4">
             <a:extLst>
               <a:ext uri="{FF2B5EF4-FFF2-40B4-BE49-F238E27FC236}">
-                <a16:creationId xmlns:a16="http://schemas.microsoft.com/office/drawing/2014/main" id="{334325E0-AB58-46FD-8AFE-02191BDB388B}"/>
+                <a16:creationId xmlns:a16="http://schemas.microsoft.com/office/drawing/2014/main" id="{E31F5CD4-F489-4A5E-9935-C88732CAAAFD}"/>
               </a:ext>
             </a:extLst>
           </p:cNvPr>
@@ -17217,7 +17220,7 @@
           <p:cNvPr id="6" name="Datumsplatzhalter 5">
             <a:extLst>
               <a:ext uri="{FF2B5EF4-FFF2-40B4-BE49-F238E27FC236}">
-                <a16:creationId xmlns:a16="http://schemas.microsoft.com/office/drawing/2014/main" id="{002EF857-02C8-4D26-918C-84FF9AACED99}"/>
+                <a16:creationId xmlns:a16="http://schemas.microsoft.com/office/drawing/2014/main" id="{B6462FF8-45C9-4CD0-ACEC-B0E66CEECCB5}"/>
               </a:ext>
             </a:extLst>
           </p:cNvPr>
@@ -17245,7 +17248,7 @@
           <p:cNvPr id="7" name="Fußzeilenplatzhalter 6">
             <a:extLst>
               <a:ext uri="{FF2B5EF4-FFF2-40B4-BE49-F238E27FC236}">
-                <a16:creationId xmlns:a16="http://schemas.microsoft.com/office/drawing/2014/main" id="{E1132CEF-ED11-4C22-8F2C-07C78602E440}"/>
+                <a16:creationId xmlns:a16="http://schemas.microsoft.com/office/drawing/2014/main" id="{7A7B367A-8847-4B51-827F-D0249922448F}"/>
               </a:ext>
             </a:extLst>
           </p:cNvPr>
@@ -17277,7 +17280,7 @@
           <p:cNvPr id="8" name="Foliennummernplatzhalter 7">
             <a:extLst>
               <a:ext uri="{FF2B5EF4-FFF2-40B4-BE49-F238E27FC236}">
-                <a16:creationId xmlns:a16="http://schemas.microsoft.com/office/drawing/2014/main" id="{FA8473E2-9FA5-4DE7-B336-FA60A6D510FE}"/>
+                <a16:creationId xmlns:a16="http://schemas.microsoft.com/office/drawing/2014/main" id="{F9EE2CBC-2785-4DA2-82FF-C2FFEA17D854}"/>
               </a:ext>
             </a:extLst>
           </p:cNvPr>
@@ -17305,7 +17308,7 @@
     </p:spTree>
     <p:extLst>
       <p:ext uri="{BB962C8B-B14F-4D97-AF65-F5344CB8AC3E}">
-        <p14:creationId xmlns:p14="http://schemas.microsoft.com/office/powerpoint/2010/main" val="544119244"/>
+        <p14:creationId xmlns:p14="http://schemas.microsoft.com/office/powerpoint/2010/main" val="3766836284"/>
       </p:ext>
     </p:extLst>
   </p:cSld>
@@ -17337,6 +17340,330 @@
           <p:cNvPr id="2" name="Textplatzhalter 1">
             <a:extLst>
               <a:ext uri="{FF2B5EF4-FFF2-40B4-BE49-F238E27FC236}">
+                <a16:creationId xmlns:a16="http://schemas.microsoft.com/office/drawing/2014/main" id="{373A6D3C-34EA-4692-B0A9-DC99C8CF6071}"/>
+              </a:ext>
+            </a:extLst>
+          </p:cNvPr>
+          <p:cNvSpPr>
+            <a:spLocks noGrp="1"/>
+          </p:cNvSpPr>
+          <p:nvPr>
+            <p:ph type="body" sz="quarter" idx="13"/>
+          </p:nvPr>
+        </p:nvSpPr>
+        <p:spPr/>
+        <p:txBody>
+          <a:bodyPr/>
+          <a:lstStyle/>
+          <a:p>
+            <a:r>
+              <a:rPr lang="de-DE" dirty="0"/>
+              <a:t>Download vom </a:t>
+            </a:r>
+            <a:r>
+              <a:rPr lang="de-DE" dirty="0" err="1"/>
+              <a:t>Skyserver</a:t>
+            </a:r>
+            <a:endParaRPr lang="de-DE" dirty="0"/>
+          </a:p>
+        </p:txBody>
+      </p:sp>
+      <p:sp>
+        <p:nvSpPr>
+          <p:cNvPr id="3" name="Textplatzhalter 2">
+            <a:extLst>
+              <a:ext uri="{FF2B5EF4-FFF2-40B4-BE49-F238E27FC236}">
+                <a16:creationId xmlns:a16="http://schemas.microsoft.com/office/drawing/2014/main" id="{27EE4A62-2CAB-4AF3-972E-B4ED64A49260}"/>
+              </a:ext>
+            </a:extLst>
+          </p:cNvPr>
+          <p:cNvSpPr>
+            <a:spLocks noGrp="1"/>
+          </p:cNvSpPr>
+          <p:nvPr>
+            <p:ph type="body" sz="quarter" idx="14"/>
+          </p:nvPr>
+        </p:nvSpPr>
+        <p:spPr>
+          <a:xfrm>
+            <a:off x="214770" y="1779662"/>
+            <a:ext cx="8749718" cy="2880320"/>
+          </a:xfrm>
+        </p:spPr>
+        <p:txBody>
+          <a:bodyPr/>
+          <a:lstStyle/>
+          <a:p>
+            <a:pPr marL="342900" indent="-342900">
+              <a:buFont typeface="Arial" panose="020B0604020202020204" pitchFamily="34" charset="0"/>
+              <a:buChar char="•"/>
+            </a:pPr>
+            <a:r>
+              <a:rPr lang="de-DE" dirty="0"/>
+              <a:t>Der </a:t>
+            </a:r>
+            <a:r>
+              <a:rPr lang="de-DE" dirty="0" err="1"/>
+              <a:t>Skyserver</a:t>
+            </a:r>
+            <a:r>
+              <a:rPr lang="de-DE" dirty="0"/>
+              <a:t> bietet Zugriff auf alle öffentlich verfügbaren Daten (Spektren, </a:t>
+            </a:r>
+            <a:r>
+              <a:rPr lang="de-DE" dirty="0" err="1"/>
+              <a:t>fits-Dtaeien</a:t>
+            </a:r>
+            <a:r>
+              <a:rPr lang="de-DE" dirty="0"/>
+              <a:t>, </a:t>
+            </a:r>
+            <a:r>
+              <a:rPr lang="de-DE" dirty="0" err="1"/>
+              <a:t>jpg</a:t>
+            </a:r>
+            <a:r>
+              <a:rPr lang="de-DE" dirty="0"/>
+              <a:t>-Bilder, usw.)</a:t>
+            </a:r>
+          </a:p>
+          <a:p>
+            <a:pPr marL="342900" indent="-342900">
+              <a:buFont typeface="Arial" panose="020B0604020202020204" pitchFamily="34" charset="0"/>
+              <a:buChar char="•"/>
+            </a:pPr>
+            <a:endParaRPr lang="de-DE" dirty="0"/>
+          </a:p>
+          <a:p>
+            <a:pPr marL="342900" indent="-342900">
+              <a:buFont typeface="Arial" panose="020B0604020202020204" pitchFamily="34" charset="0"/>
+              <a:buChar char="•"/>
+            </a:pPr>
+            <a:r>
+              <a:rPr lang="de-DE" dirty="0"/>
+              <a:t>Zugriff </a:t>
+            </a:r>
+            <a:r>
+              <a:rPr lang="de-DE" dirty="0" err="1"/>
+              <a:t>bsw</a:t>
+            </a:r>
+            <a:r>
+              <a:rPr lang="de-DE" dirty="0"/>
+              <a:t>. über das </a:t>
+            </a:r>
+            <a:r>
+              <a:rPr lang="de-DE" dirty="0">
+                <a:hlinkClick r:id="rId2"/>
+              </a:rPr>
+              <a:t>Navigations-Tool</a:t>
+            </a:r>
+            <a:r>
+              <a:rPr lang="de-DE" dirty="0"/>
+              <a:t> oder eine </a:t>
+            </a:r>
+            <a:r>
+              <a:rPr lang="de-DE" dirty="0">
+                <a:hlinkClick r:id="rId3"/>
+              </a:rPr>
+              <a:t>SQL-Suche</a:t>
+            </a:r>
+            <a:endParaRPr lang="de-DE" dirty="0"/>
+          </a:p>
+          <a:p>
+            <a:pPr marL="342900" indent="-342900">
+              <a:buFont typeface="Arial" panose="020B0604020202020204" pitchFamily="34" charset="0"/>
+              <a:buChar char="•"/>
+            </a:pPr>
+            <a:endParaRPr lang="de-DE" dirty="0"/>
+          </a:p>
+          <a:p>
+            <a:pPr marL="342900" indent="-342900">
+              <a:buFont typeface="Arial" panose="020B0604020202020204" pitchFamily="34" charset="0"/>
+              <a:buChar char="•"/>
+            </a:pPr>
+            <a:r>
+              <a:rPr lang="de-DE" dirty="0"/>
+              <a:t>Der </a:t>
+            </a:r>
+            <a:r>
+              <a:rPr lang="de-DE" dirty="0">
+                <a:hlinkClick r:id="rId4"/>
+              </a:rPr>
+              <a:t>Schema-Browser</a:t>
+            </a:r>
+            <a:r>
+              <a:rPr lang="de-DE" dirty="0"/>
+              <a:t> listet alle durchsuchbaren Tabellen auf</a:t>
+            </a:r>
+          </a:p>
+        </p:txBody>
+      </p:sp>
+      <p:sp>
+        <p:nvSpPr>
+          <p:cNvPr id="5" name="Titel 4">
+            <a:extLst>
+              <a:ext uri="{FF2B5EF4-FFF2-40B4-BE49-F238E27FC236}">
+                <a16:creationId xmlns:a16="http://schemas.microsoft.com/office/drawing/2014/main" id="{334325E0-AB58-46FD-8AFE-02191BDB388B}"/>
+              </a:ext>
+            </a:extLst>
+          </p:cNvPr>
+          <p:cNvSpPr>
+            <a:spLocks noGrp="1"/>
+          </p:cNvSpPr>
+          <p:nvPr>
+            <p:ph type="title"/>
+          </p:nvPr>
+        </p:nvSpPr>
+        <p:spPr/>
+        <p:txBody>
+          <a:bodyPr/>
+          <a:lstStyle/>
+          <a:p>
+            <a:r>
+              <a:rPr lang="de-DE" dirty="0"/>
+              <a:t>Klassifizierung von </a:t>
+            </a:r>
+            <a:r>
+              <a:rPr lang="de-DE" dirty="0" err="1"/>
+              <a:t>sdss</a:t>
+            </a:r>
+            <a:r>
+              <a:rPr lang="de-DE" dirty="0"/>
+              <a:t> </a:t>
+            </a:r>
+            <a:r>
+              <a:rPr lang="de-DE" dirty="0" err="1"/>
+              <a:t>spektraldaten</a:t>
+            </a:r>
+            <a:endParaRPr lang="de-DE" dirty="0"/>
+          </a:p>
+        </p:txBody>
+      </p:sp>
+      <p:sp>
+        <p:nvSpPr>
+          <p:cNvPr id="6" name="Datumsplatzhalter 5">
+            <a:extLst>
+              <a:ext uri="{FF2B5EF4-FFF2-40B4-BE49-F238E27FC236}">
+                <a16:creationId xmlns:a16="http://schemas.microsoft.com/office/drawing/2014/main" id="{002EF857-02C8-4D26-918C-84FF9AACED99}"/>
+              </a:ext>
+            </a:extLst>
+          </p:cNvPr>
+          <p:cNvSpPr>
+            <a:spLocks noGrp="1"/>
+          </p:cNvSpPr>
+          <p:nvPr>
+            <p:ph type="dt" sz="half" idx="17"/>
+          </p:nvPr>
+        </p:nvSpPr>
+        <p:spPr/>
+        <p:txBody>
+          <a:bodyPr/>
+          <a:lstStyle/>
+          <a:p>
+            <a:r>
+              <a:rPr lang="de-DE"/>
+              <a:t>24.08.2021</a:t>
+            </a:r>
+          </a:p>
+        </p:txBody>
+      </p:sp>
+      <p:sp>
+        <p:nvSpPr>
+          <p:cNvPr id="7" name="Fußzeilenplatzhalter 6">
+            <a:extLst>
+              <a:ext uri="{FF2B5EF4-FFF2-40B4-BE49-F238E27FC236}">
+                <a16:creationId xmlns:a16="http://schemas.microsoft.com/office/drawing/2014/main" id="{E1132CEF-ED11-4C22-8F2C-07C78602E440}"/>
+              </a:ext>
+            </a:extLst>
+          </p:cNvPr>
+          <p:cNvSpPr>
+            <a:spLocks noGrp="1"/>
+          </p:cNvSpPr>
+          <p:nvPr>
+            <p:ph type="ftr" sz="quarter" idx="18"/>
+          </p:nvPr>
+        </p:nvSpPr>
+        <p:spPr/>
+        <p:txBody>
+          <a:bodyPr/>
+          <a:lstStyle/>
+          <a:p>
+            <a:r>
+              <a:rPr lang="de-DE" dirty="0">
+                <a:latin typeface="TheSans UHH Bold Caps"/>
+                <a:cs typeface="TheSans UHH Bold Caps"/>
+              </a:rPr>
+              <a:t>Machine Learning</a:t>
+            </a:r>
+            <a:endParaRPr lang="de-DE" dirty="0"/>
+          </a:p>
+        </p:txBody>
+      </p:sp>
+      <p:sp>
+        <p:nvSpPr>
+          <p:cNvPr id="8" name="Foliennummernplatzhalter 7">
+            <a:extLst>
+              <a:ext uri="{FF2B5EF4-FFF2-40B4-BE49-F238E27FC236}">
+                <a16:creationId xmlns:a16="http://schemas.microsoft.com/office/drawing/2014/main" id="{FA8473E2-9FA5-4DE7-B336-FA60A6D510FE}"/>
+              </a:ext>
+            </a:extLst>
+          </p:cNvPr>
+          <p:cNvSpPr>
+            <a:spLocks noGrp="1"/>
+          </p:cNvSpPr>
+          <p:nvPr>
+            <p:ph type="sldNum" sz="quarter" idx="19"/>
+          </p:nvPr>
+        </p:nvSpPr>
+        <p:spPr/>
+        <p:txBody>
+          <a:bodyPr/>
+          <a:lstStyle/>
+          <a:p>
+            <a:fld id="{3E01A2B2-10AD-754B-9B4C-E5B6FED423D0}" type="slidenum">
+              <a:rPr lang="de-DE" smtClean="0"/>
+              <a:pPr/>
+              <a:t>47</a:t>
+            </a:fld>
+            <a:endParaRPr lang="de-DE"/>
+          </a:p>
+        </p:txBody>
+      </p:sp>
+    </p:spTree>
+    <p:extLst>
+      <p:ext uri="{BB962C8B-B14F-4D97-AF65-F5344CB8AC3E}">
+        <p14:creationId xmlns:p14="http://schemas.microsoft.com/office/powerpoint/2010/main" val="544119244"/>
+      </p:ext>
+    </p:extLst>
+  </p:cSld>
+  <p:clrMapOvr>
+    <a:masterClrMapping/>
+  </p:clrMapOvr>
+</p:sld>
+</file>
+
+<file path=ppt/slides/slide48.xml><?xml version="1.0" encoding="utf-8"?>
+<p:sld xmlns:a="http://schemas.openxmlformats.org/drawingml/2006/main" xmlns:r="http://schemas.openxmlformats.org/officeDocument/2006/relationships" xmlns:p="http://schemas.openxmlformats.org/presentationml/2006/main">
+  <p:cSld>
+    <p:spTree>
+      <p:nvGrpSpPr>
+        <p:cNvPr id="1" name=""/>
+        <p:cNvGrpSpPr/>
+        <p:nvPr/>
+      </p:nvGrpSpPr>
+      <p:grpSpPr>
+        <a:xfrm>
+          <a:off x="0" y="0"/>
+          <a:ext cx="0" cy="0"/>
+          <a:chOff x="0" y="0"/>
+          <a:chExt cx="0" cy="0"/>
+        </a:xfrm>
+      </p:grpSpPr>
+      <p:sp>
+        <p:nvSpPr>
+          <p:cNvPr id="2" name="Textplatzhalter 1">
+            <a:extLst>
+              <a:ext uri="{FF2B5EF4-FFF2-40B4-BE49-F238E27FC236}">
                 <a16:creationId xmlns:a16="http://schemas.microsoft.com/office/drawing/2014/main" id="{13757325-7BD9-484B-938D-C4A2ACD51A2B}"/>
               </a:ext>
             </a:extLst>
@@ -17583,7 +17910,7 @@
             <a:fld id="{3E01A2B2-10AD-754B-9B4C-E5B6FED423D0}" type="slidenum">
               <a:rPr lang="de-DE" smtClean="0"/>
               <a:pPr/>
-              <a:t>47</a:t>
+              <a:t>48</a:t>
             </a:fld>
             <a:endParaRPr lang="de-DE"/>
           </a:p>
@@ -17632,7 +17959,7 @@
 </p:sld>
 </file>
 
-<file path=ppt/slides/slide48.xml><?xml version="1.0" encoding="utf-8"?>
+<file path=ppt/slides/slide49.xml><?xml version="1.0" encoding="utf-8"?>
 <p:sld xmlns:a="http://schemas.openxmlformats.org/drawingml/2006/main" xmlns:r="http://schemas.openxmlformats.org/officeDocument/2006/relationships" xmlns:p="http://schemas.openxmlformats.org/presentationml/2006/main">
   <p:cSld>
     <p:spTree>
@@ -17844,7 +18171,7 @@
             <a:fld id="{3E01A2B2-10AD-754B-9B4C-E5B6FED423D0}" type="slidenum">
               <a:rPr lang="de-DE" smtClean="0"/>
               <a:pPr/>
-              <a:t>48</a:t>
+              <a:t>49</a:t>
             </a:fld>
             <a:endParaRPr lang="de-DE"/>
           </a:p>
@@ -17884,235 +18211,6 @@
     <p:extLst>
       <p:ext uri="{BB962C8B-B14F-4D97-AF65-F5344CB8AC3E}">
         <p14:creationId xmlns:p14="http://schemas.microsoft.com/office/powerpoint/2010/main" val="3802285717"/>
-      </p:ext>
-    </p:extLst>
-  </p:cSld>
-  <p:clrMapOvr>
-    <a:masterClrMapping/>
-  </p:clrMapOvr>
-</p:sld>
-</file>
-
-<file path=ppt/slides/slide49.xml><?xml version="1.0" encoding="utf-8"?>
-<p:sld xmlns:a="http://schemas.openxmlformats.org/drawingml/2006/main" xmlns:r="http://schemas.openxmlformats.org/officeDocument/2006/relationships" xmlns:p="http://schemas.openxmlformats.org/presentationml/2006/main">
-  <p:cSld>
-    <p:spTree>
-      <p:nvGrpSpPr>
-        <p:cNvPr id="1" name=""/>
-        <p:cNvGrpSpPr/>
-        <p:nvPr/>
-      </p:nvGrpSpPr>
-      <p:grpSpPr>
-        <a:xfrm>
-          <a:off x="0" y="0"/>
-          <a:ext cx="0" cy="0"/>
-          <a:chOff x="0" y="0"/>
-          <a:chExt cx="0" cy="0"/>
-        </a:xfrm>
-      </p:grpSpPr>
-      <p:sp>
-        <p:nvSpPr>
-          <p:cNvPr id="5" name="Titel 4">
-            <a:extLst>
-              <a:ext uri="{FF2B5EF4-FFF2-40B4-BE49-F238E27FC236}">
-                <a16:creationId xmlns:a16="http://schemas.microsoft.com/office/drawing/2014/main" id="{5C3CF086-38CF-4551-8828-B2090DE573D1}"/>
-              </a:ext>
-            </a:extLst>
-          </p:cNvPr>
-          <p:cNvSpPr>
-            <a:spLocks noGrp="1"/>
-          </p:cNvSpPr>
-          <p:nvPr>
-            <p:ph type="title"/>
-          </p:nvPr>
-        </p:nvSpPr>
-        <p:spPr/>
-        <p:txBody>
-          <a:bodyPr/>
-          <a:lstStyle/>
-          <a:p>
-            <a:r>
-              <a:rPr lang="de-DE" dirty="0"/>
-              <a:t>Klassifizierung von </a:t>
-            </a:r>
-            <a:r>
-              <a:rPr lang="de-DE" dirty="0" err="1"/>
-              <a:t>sdss</a:t>
-            </a:r>
-            <a:r>
-              <a:rPr lang="de-DE" dirty="0"/>
-              <a:t> </a:t>
-            </a:r>
-            <a:r>
-              <a:rPr lang="de-DE" dirty="0" err="1"/>
-              <a:t>spektraldaten</a:t>
-            </a:r>
-            <a:endParaRPr lang="de-DE" dirty="0"/>
-          </a:p>
-        </p:txBody>
-      </p:sp>
-      <p:sp>
-        <p:nvSpPr>
-          <p:cNvPr id="6" name="Datumsplatzhalter 5">
-            <a:extLst>
-              <a:ext uri="{FF2B5EF4-FFF2-40B4-BE49-F238E27FC236}">
-                <a16:creationId xmlns:a16="http://schemas.microsoft.com/office/drawing/2014/main" id="{32A14312-C1F8-401D-AED7-AC98AECBDD6D}"/>
-              </a:ext>
-            </a:extLst>
-          </p:cNvPr>
-          <p:cNvSpPr>
-            <a:spLocks noGrp="1"/>
-          </p:cNvSpPr>
-          <p:nvPr>
-            <p:ph type="dt" sz="half" idx="17"/>
-          </p:nvPr>
-        </p:nvSpPr>
-        <p:spPr/>
-        <p:txBody>
-          <a:bodyPr/>
-          <a:lstStyle/>
-          <a:p>
-            <a:r>
-              <a:rPr lang="de-DE"/>
-              <a:t>24.08.2021</a:t>
-            </a:r>
-          </a:p>
-        </p:txBody>
-      </p:sp>
-      <p:sp>
-        <p:nvSpPr>
-          <p:cNvPr id="7" name="Fußzeilenplatzhalter 6">
-            <a:extLst>
-              <a:ext uri="{FF2B5EF4-FFF2-40B4-BE49-F238E27FC236}">
-                <a16:creationId xmlns:a16="http://schemas.microsoft.com/office/drawing/2014/main" id="{9800113A-CA82-407C-881B-C65C946B6EFA}"/>
-              </a:ext>
-            </a:extLst>
-          </p:cNvPr>
-          <p:cNvSpPr>
-            <a:spLocks noGrp="1"/>
-          </p:cNvSpPr>
-          <p:nvPr>
-            <p:ph type="ftr" sz="quarter" idx="18"/>
-          </p:nvPr>
-        </p:nvSpPr>
-        <p:spPr/>
-        <p:txBody>
-          <a:bodyPr/>
-          <a:lstStyle/>
-          <a:p>
-            <a:r>
-              <a:rPr lang="de-DE" dirty="0">
-                <a:latin typeface="TheSans UHH Bold Caps"/>
-                <a:cs typeface="TheSans UHH Bold Caps"/>
-              </a:rPr>
-              <a:t>Machine Learning</a:t>
-            </a:r>
-            <a:endParaRPr lang="de-DE" dirty="0"/>
-          </a:p>
-        </p:txBody>
-      </p:sp>
-      <p:sp>
-        <p:nvSpPr>
-          <p:cNvPr id="8" name="Foliennummernplatzhalter 7">
-            <a:extLst>
-              <a:ext uri="{FF2B5EF4-FFF2-40B4-BE49-F238E27FC236}">
-                <a16:creationId xmlns:a16="http://schemas.microsoft.com/office/drawing/2014/main" id="{D3A31804-645A-442A-A7D6-A23E960CB1B8}"/>
-              </a:ext>
-            </a:extLst>
-          </p:cNvPr>
-          <p:cNvSpPr>
-            <a:spLocks noGrp="1"/>
-          </p:cNvSpPr>
-          <p:nvPr>
-            <p:ph type="sldNum" sz="quarter" idx="19"/>
-          </p:nvPr>
-        </p:nvSpPr>
-        <p:spPr/>
-        <p:txBody>
-          <a:bodyPr/>
-          <a:lstStyle/>
-          <a:p>
-            <a:fld id="{3E01A2B2-10AD-754B-9B4C-E5B6FED423D0}" type="slidenum">
-              <a:rPr lang="de-DE" smtClean="0"/>
-              <a:pPr/>
-              <a:t>49</a:t>
-            </a:fld>
-            <a:endParaRPr lang="de-DE"/>
-          </a:p>
-        </p:txBody>
-      </p:sp>
-      <p:pic>
-        <p:nvPicPr>
-          <p:cNvPr id="10" name="Grafik 9">
-            <a:extLst>
-              <a:ext uri="{FF2B5EF4-FFF2-40B4-BE49-F238E27FC236}">
-                <a16:creationId xmlns:a16="http://schemas.microsoft.com/office/drawing/2014/main" id="{9670105C-B262-4E1C-A341-CDDD013E3A41}"/>
-              </a:ext>
-            </a:extLst>
-          </p:cNvPr>
-          <p:cNvPicPr>
-            <a:picLocks noChangeAspect="1"/>
-          </p:cNvPicPr>
-          <p:nvPr/>
-        </p:nvPicPr>
-        <p:blipFill>
-          <a:blip r:embed="rId2"/>
-          <a:stretch>
-            <a:fillRect/>
-          </a:stretch>
-        </p:blipFill>
-        <p:spPr>
-          <a:xfrm>
-            <a:off x="834586" y="1160100"/>
-            <a:ext cx="7474828" cy="3635019"/>
-          </a:xfrm>
-          <a:prstGeom prst="rect">
-            <a:avLst/>
-          </a:prstGeom>
-        </p:spPr>
-      </p:pic>
-      <p:sp>
-        <p:nvSpPr>
-          <p:cNvPr id="11" name="Textfeld 10">
-            <a:extLst>
-              <a:ext uri="{FF2B5EF4-FFF2-40B4-BE49-F238E27FC236}">
-                <a16:creationId xmlns:a16="http://schemas.microsoft.com/office/drawing/2014/main" id="{A6B1DDC6-40CA-4471-893A-FEAE1F299E6A}"/>
-              </a:ext>
-            </a:extLst>
-          </p:cNvPr>
-          <p:cNvSpPr txBox="1"/>
-          <p:nvPr/>
-        </p:nvSpPr>
-        <p:spPr>
-          <a:xfrm>
-            <a:off x="4139952" y="1059582"/>
-            <a:ext cx="1455848" cy="369332"/>
-          </a:xfrm>
-          <a:prstGeom prst="rect">
-            <a:avLst/>
-          </a:prstGeom>
-          <a:noFill/>
-        </p:spPr>
-        <p:txBody>
-          <a:bodyPr wrap="none" rtlCol="0">
-            <a:spAutoFit/>
-          </a:bodyPr>
-          <a:lstStyle/>
-          <a:p>
-            <a:r>
-              <a:rPr lang="de-DE" dirty="0">
-                <a:sym typeface="Wingdings" panose="05000000000000000000" pitchFamily="2" charset="2"/>
-              </a:rPr>
-              <a:t> SQL-Suche</a:t>
-            </a:r>
-            <a:endParaRPr lang="de-DE" dirty="0"/>
-          </a:p>
-        </p:txBody>
-      </p:sp>
-    </p:spTree>
-    <p:extLst>
-      <p:ext uri="{BB962C8B-B14F-4D97-AF65-F5344CB8AC3E}">
-        <p14:creationId xmlns:p14="http://schemas.microsoft.com/office/powerpoint/2010/main" val="320761901"/>
       </p:ext>
     </p:extLst>
   </p:cSld>
@@ -18467,6 +18565,273 @@
       </p:grpSpPr>
       <p:sp>
         <p:nvSpPr>
+          <p:cNvPr id="5" name="Titel 4">
+            <a:extLst>
+              <a:ext uri="{FF2B5EF4-FFF2-40B4-BE49-F238E27FC236}">
+                <a16:creationId xmlns:a16="http://schemas.microsoft.com/office/drawing/2014/main" id="{5C3CF086-38CF-4551-8828-B2090DE573D1}"/>
+              </a:ext>
+            </a:extLst>
+          </p:cNvPr>
+          <p:cNvSpPr>
+            <a:spLocks noGrp="1"/>
+          </p:cNvSpPr>
+          <p:nvPr>
+            <p:ph type="title"/>
+          </p:nvPr>
+        </p:nvSpPr>
+        <p:spPr/>
+        <p:txBody>
+          <a:bodyPr/>
+          <a:lstStyle/>
+          <a:p>
+            <a:r>
+              <a:rPr lang="de-DE" dirty="0"/>
+              <a:t>Klassifizierung von </a:t>
+            </a:r>
+            <a:r>
+              <a:rPr lang="de-DE" dirty="0" err="1"/>
+              <a:t>sdss</a:t>
+            </a:r>
+            <a:r>
+              <a:rPr lang="de-DE" dirty="0"/>
+              <a:t> </a:t>
+            </a:r>
+            <a:r>
+              <a:rPr lang="de-DE" dirty="0" err="1"/>
+              <a:t>spektraldaten</a:t>
+            </a:r>
+            <a:endParaRPr lang="de-DE" dirty="0"/>
+          </a:p>
+        </p:txBody>
+      </p:sp>
+      <p:sp>
+        <p:nvSpPr>
+          <p:cNvPr id="6" name="Datumsplatzhalter 5">
+            <a:extLst>
+              <a:ext uri="{FF2B5EF4-FFF2-40B4-BE49-F238E27FC236}">
+                <a16:creationId xmlns:a16="http://schemas.microsoft.com/office/drawing/2014/main" id="{32A14312-C1F8-401D-AED7-AC98AECBDD6D}"/>
+              </a:ext>
+            </a:extLst>
+          </p:cNvPr>
+          <p:cNvSpPr>
+            <a:spLocks noGrp="1"/>
+          </p:cNvSpPr>
+          <p:nvPr>
+            <p:ph type="dt" sz="half" idx="17"/>
+          </p:nvPr>
+        </p:nvSpPr>
+        <p:spPr/>
+        <p:txBody>
+          <a:bodyPr/>
+          <a:lstStyle/>
+          <a:p>
+            <a:r>
+              <a:rPr lang="de-DE"/>
+              <a:t>24.08.2021</a:t>
+            </a:r>
+          </a:p>
+        </p:txBody>
+      </p:sp>
+      <p:sp>
+        <p:nvSpPr>
+          <p:cNvPr id="7" name="Fußzeilenplatzhalter 6">
+            <a:extLst>
+              <a:ext uri="{FF2B5EF4-FFF2-40B4-BE49-F238E27FC236}">
+                <a16:creationId xmlns:a16="http://schemas.microsoft.com/office/drawing/2014/main" id="{9800113A-CA82-407C-881B-C65C946B6EFA}"/>
+              </a:ext>
+            </a:extLst>
+          </p:cNvPr>
+          <p:cNvSpPr>
+            <a:spLocks noGrp="1"/>
+          </p:cNvSpPr>
+          <p:nvPr>
+            <p:ph type="ftr" sz="quarter" idx="18"/>
+          </p:nvPr>
+        </p:nvSpPr>
+        <p:spPr/>
+        <p:txBody>
+          <a:bodyPr/>
+          <a:lstStyle/>
+          <a:p>
+            <a:r>
+              <a:rPr lang="de-DE" dirty="0">
+                <a:latin typeface="TheSans UHH Bold Caps"/>
+                <a:cs typeface="TheSans UHH Bold Caps"/>
+              </a:rPr>
+              <a:t>Machine Learning</a:t>
+            </a:r>
+            <a:endParaRPr lang="de-DE" dirty="0"/>
+          </a:p>
+        </p:txBody>
+      </p:sp>
+      <p:sp>
+        <p:nvSpPr>
+          <p:cNvPr id="8" name="Foliennummernplatzhalter 7">
+            <a:extLst>
+              <a:ext uri="{FF2B5EF4-FFF2-40B4-BE49-F238E27FC236}">
+                <a16:creationId xmlns:a16="http://schemas.microsoft.com/office/drawing/2014/main" id="{D3A31804-645A-442A-A7D6-A23E960CB1B8}"/>
+              </a:ext>
+            </a:extLst>
+          </p:cNvPr>
+          <p:cNvSpPr>
+            <a:spLocks noGrp="1"/>
+          </p:cNvSpPr>
+          <p:nvPr>
+            <p:ph type="sldNum" sz="quarter" idx="19"/>
+          </p:nvPr>
+        </p:nvSpPr>
+        <p:spPr/>
+        <p:txBody>
+          <a:bodyPr/>
+          <a:lstStyle/>
+          <a:p>
+            <a:fld id="{3E01A2B2-10AD-754B-9B4C-E5B6FED423D0}" type="slidenum">
+              <a:rPr lang="de-DE" smtClean="0"/>
+              <a:pPr/>
+              <a:t>50</a:t>
+            </a:fld>
+            <a:endParaRPr lang="de-DE"/>
+          </a:p>
+        </p:txBody>
+      </p:sp>
+      <p:pic>
+        <p:nvPicPr>
+          <p:cNvPr id="10" name="Grafik 9">
+            <a:extLst>
+              <a:ext uri="{FF2B5EF4-FFF2-40B4-BE49-F238E27FC236}">
+                <a16:creationId xmlns:a16="http://schemas.microsoft.com/office/drawing/2014/main" id="{9670105C-B262-4E1C-A341-CDDD013E3A41}"/>
+              </a:ext>
+            </a:extLst>
+          </p:cNvPr>
+          <p:cNvPicPr>
+            <a:picLocks noChangeAspect="1"/>
+          </p:cNvPicPr>
+          <p:nvPr/>
+        </p:nvPicPr>
+        <p:blipFill>
+          <a:blip r:embed="rId2"/>
+          <a:stretch>
+            <a:fillRect/>
+          </a:stretch>
+        </p:blipFill>
+        <p:spPr>
+          <a:xfrm>
+            <a:off x="834586" y="1160100"/>
+            <a:ext cx="7474828" cy="3635019"/>
+          </a:xfrm>
+          <a:prstGeom prst="rect">
+            <a:avLst/>
+          </a:prstGeom>
+        </p:spPr>
+      </p:pic>
+      <p:sp>
+        <p:nvSpPr>
+          <p:cNvPr id="11" name="Textfeld 10">
+            <a:extLst>
+              <a:ext uri="{FF2B5EF4-FFF2-40B4-BE49-F238E27FC236}">
+                <a16:creationId xmlns:a16="http://schemas.microsoft.com/office/drawing/2014/main" id="{A6B1DDC6-40CA-4471-893A-FEAE1F299E6A}"/>
+              </a:ext>
+            </a:extLst>
+          </p:cNvPr>
+          <p:cNvSpPr txBox="1"/>
+          <p:nvPr/>
+        </p:nvSpPr>
+        <p:spPr>
+          <a:xfrm>
+            <a:off x="4139952" y="1059582"/>
+            <a:ext cx="1455848" cy="369332"/>
+          </a:xfrm>
+          <a:prstGeom prst="rect">
+            <a:avLst/>
+          </a:prstGeom>
+          <a:noFill/>
+        </p:spPr>
+        <p:txBody>
+          <a:bodyPr wrap="none" rtlCol="0">
+            <a:spAutoFit/>
+          </a:bodyPr>
+          <a:lstStyle/>
+          <a:p>
+            <a:r>
+              <a:rPr lang="de-DE" dirty="0">
+                <a:sym typeface="Wingdings" panose="05000000000000000000" pitchFamily="2" charset="2"/>
+              </a:rPr>
+              <a:t> SQL-Suche</a:t>
+            </a:r>
+            <a:endParaRPr lang="de-DE" dirty="0"/>
+          </a:p>
+        </p:txBody>
+      </p:sp>
+      <p:sp>
+        <p:nvSpPr>
+          <p:cNvPr id="9" name="Textfeld 8">
+            <a:extLst>
+              <a:ext uri="{FF2B5EF4-FFF2-40B4-BE49-F238E27FC236}">
+                <a16:creationId xmlns:a16="http://schemas.microsoft.com/office/drawing/2014/main" id="{76EAF6B9-88C1-41EE-8FF3-A68AEE43B0A3}"/>
+              </a:ext>
+            </a:extLst>
+          </p:cNvPr>
+          <p:cNvSpPr txBox="1"/>
+          <p:nvPr/>
+        </p:nvSpPr>
+        <p:spPr>
+          <a:xfrm>
+            <a:off x="4903070" y="2355726"/>
+            <a:ext cx="3695563" cy="369332"/>
+          </a:xfrm>
+          <a:prstGeom prst="rect">
+            <a:avLst/>
+          </a:prstGeom>
+          <a:noFill/>
+        </p:spPr>
+        <p:txBody>
+          <a:bodyPr wrap="none" rtlCol="0">
+            <a:spAutoFit/>
+          </a:bodyPr>
+          <a:lstStyle/>
+          <a:p>
+            <a:r>
+              <a:rPr lang="de-DE" dirty="0">
+                <a:sym typeface="Wingdings" panose="05000000000000000000" pitchFamily="2" charset="2"/>
+              </a:rPr>
+              <a:t>Beispiel: spec-0266-51630-0013.fits </a:t>
+            </a:r>
+            <a:endParaRPr lang="de-DE" dirty="0"/>
+          </a:p>
+        </p:txBody>
+      </p:sp>
+    </p:spTree>
+    <p:extLst>
+      <p:ext uri="{BB962C8B-B14F-4D97-AF65-F5344CB8AC3E}">
+        <p14:creationId xmlns:p14="http://schemas.microsoft.com/office/powerpoint/2010/main" val="320761901"/>
+      </p:ext>
+    </p:extLst>
+  </p:cSld>
+  <p:clrMapOvr>
+    <a:masterClrMapping/>
+  </p:clrMapOvr>
+</p:sld>
+</file>
+
+<file path=ppt/slides/slide51.xml><?xml version="1.0" encoding="utf-8"?>
+<p:sld xmlns:a="http://schemas.openxmlformats.org/drawingml/2006/main" xmlns:r="http://schemas.openxmlformats.org/officeDocument/2006/relationships" xmlns:p="http://schemas.openxmlformats.org/presentationml/2006/main">
+  <p:cSld>
+    <p:spTree>
+      <p:nvGrpSpPr>
+        <p:cNvPr id="1" name=""/>
+        <p:cNvGrpSpPr/>
+        <p:nvPr/>
+      </p:nvGrpSpPr>
+      <p:grpSpPr>
+        <a:xfrm>
+          <a:off x="0" y="0"/>
+          <a:ext cx="0" cy="0"/>
+          <a:chOff x="0" y="0"/>
+          <a:chExt cx="0" cy="0"/>
+        </a:xfrm>
+      </p:grpSpPr>
+      <p:sp>
+        <p:nvSpPr>
           <p:cNvPr id="2" name="Textplatzhalter 1">
             <a:extLst>
               <a:ext uri="{FF2B5EF4-FFF2-40B4-BE49-F238E27FC236}">
@@ -18723,7 +19088,7 @@
             <a:fld id="{3E01A2B2-10AD-754B-9B4C-E5B6FED423D0}" type="slidenum">
               <a:rPr lang="de-DE" smtClean="0"/>
               <a:pPr/>
-              <a:t>50</a:t>
+              <a:t>51</a:t>
             </a:fld>
             <a:endParaRPr lang="de-DE"/>
           </a:p>
@@ -18920,7 +19285,7 @@
 </p:sld>
 </file>
 
-<file path=ppt/slides/slide51.xml><?xml version="1.0" encoding="utf-8"?>
+<file path=ppt/slides/slide52.xml><?xml version="1.0" encoding="utf-8"?>
 <p:sld xmlns:a="http://schemas.openxmlformats.org/drawingml/2006/main" xmlns:r="http://schemas.openxmlformats.org/officeDocument/2006/relationships" xmlns:p="http://schemas.openxmlformats.org/presentationml/2006/main">
   <p:cSld>
     <p:spTree>
@@ -19153,7 +19518,7 @@
             <a:fld id="{3E01A2B2-10AD-754B-9B4C-E5B6FED423D0}" type="slidenum">
               <a:rPr lang="de-DE" smtClean="0"/>
               <a:pPr/>
-              <a:t>51</a:t>
+              <a:t>52</a:t>
             </a:fld>
             <a:endParaRPr lang="de-DE"/>
           </a:p>
@@ -19232,7 +19597,7 @@
 </p:sld>
 </file>
 
-<file path=ppt/slides/slide52.xml><?xml version="1.0" encoding="utf-8"?>
+<file path=ppt/slides/slide53.xml><?xml version="1.0" encoding="utf-8"?>
 <p:sld xmlns:a="http://schemas.openxmlformats.org/drawingml/2006/main" xmlns:r="http://schemas.openxmlformats.org/officeDocument/2006/relationships" xmlns:p="http://schemas.openxmlformats.org/presentationml/2006/main">
   <p:cSld>
     <p:spTree>
@@ -19442,7 +19807,7 @@
             <a:fld id="{3E01A2B2-10AD-754B-9B4C-E5B6FED423D0}" type="slidenum">
               <a:rPr lang="de-DE" smtClean="0"/>
               <a:pPr/>
-              <a:t>52</a:t>
+              <a:t>53</a:t>
             </a:fld>
             <a:endParaRPr lang="de-DE"/>
           </a:p>
@@ -19491,7 +19856,7 @@
 </p:sld>
 </file>
 
-<file path=ppt/slides/slide53.xml><?xml version="1.0" encoding="utf-8"?>
+<file path=ppt/slides/slide54.xml><?xml version="1.0" encoding="utf-8"?>
 <p:sld xmlns:a="http://schemas.openxmlformats.org/drawingml/2006/main" xmlns:r="http://schemas.openxmlformats.org/officeDocument/2006/relationships" xmlns:p="http://schemas.openxmlformats.org/presentationml/2006/main">
   <p:cSld>
     <p:spTree>
@@ -19771,7 +20136,7 @@
             <a:fld id="{3E01A2B2-10AD-754B-9B4C-E5B6FED423D0}" type="slidenum">
               <a:rPr lang="de-DE" smtClean="0"/>
               <a:pPr/>
-              <a:t>53</a:t>
+              <a:t>54</a:t>
             </a:fld>
             <a:endParaRPr lang="de-DE"/>
           </a:p>
@@ -19820,7 +20185,7 @@
 </p:sld>
 </file>
 
-<file path=ppt/slides/slide54.xml><?xml version="1.0" encoding="utf-8"?>
+<file path=ppt/slides/slide55.xml><?xml version="1.0" encoding="utf-8"?>
 <p:sld xmlns:a="http://schemas.openxmlformats.org/drawingml/2006/main" xmlns:r="http://schemas.openxmlformats.org/officeDocument/2006/relationships" xmlns:p="http://schemas.openxmlformats.org/presentationml/2006/main">
   <p:cSld>
     <p:spTree>
@@ -20023,7 +20388,7 @@
             <a:fld id="{3E01A2B2-10AD-754B-9B4C-E5B6FED423D0}" type="slidenum">
               <a:rPr lang="de-DE" smtClean="0"/>
               <a:pPr/>
-              <a:t>54</a:t>
+              <a:t>55</a:t>
             </a:fld>
             <a:endParaRPr lang="de-DE"/>
           </a:p>
@@ -20042,7 +20407,7 @@
 </p:sld>
 </file>
 
-<file path=ppt/slides/slide55.xml><?xml version="1.0" encoding="utf-8"?>
+<file path=ppt/slides/slide56.xml><?xml version="1.0" encoding="utf-8"?>
 <p:sld xmlns:a="http://schemas.openxmlformats.org/drawingml/2006/main" xmlns:r="http://schemas.openxmlformats.org/officeDocument/2006/relationships" xmlns:p="http://schemas.openxmlformats.org/presentationml/2006/main">
   <p:cSld>
     <p:spTree>
@@ -20350,7 +20715,7 @@
             <a:fld id="{3E01A2B2-10AD-754B-9B4C-E5B6FED423D0}" type="slidenum">
               <a:rPr lang="de-DE" smtClean="0"/>
               <a:pPr/>
-              <a:t>55</a:t>
+              <a:t>56</a:t>
             </a:fld>
             <a:endParaRPr lang="de-DE"/>
           </a:p>
@@ -20456,7 +20821,7 @@
 </p:sld>
 </file>
 
-<file path=ppt/slides/slide56.xml><?xml version="1.0" encoding="utf-8"?>
+<file path=ppt/slides/slide57.xml><?xml version="1.0" encoding="utf-8"?>
 <p:sld xmlns:a="http://schemas.openxmlformats.org/drawingml/2006/main" xmlns:r="http://schemas.openxmlformats.org/officeDocument/2006/relationships" xmlns:p="http://schemas.openxmlformats.org/presentationml/2006/main">
   <p:cSld>
     <p:spTree>
@@ -20656,7 +21021,7 @@
             <a:fld id="{3E01A2B2-10AD-754B-9B4C-E5B6FED423D0}" type="slidenum">
               <a:rPr lang="de-DE" smtClean="0"/>
               <a:pPr/>
-              <a:t>56</a:t>
+              <a:t>57</a:t>
             </a:fld>
             <a:endParaRPr lang="de-DE"/>
           </a:p>
@@ -20666,225 +21031,6 @@
     <p:extLst>
       <p:ext uri="{BB962C8B-B14F-4D97-AF65-F5344CB8AC3E}">
         <p14:creationId xmlns:p14="http://schemas.microsoft.com/office/powerpoint/2010/main" val="3947696654"/>
-      </p:ext>
-    </p:extLst>
-  </p:cSld>
-  <p:clrMapOvr>
-    <a:masterClrMapping/>
-  </p:clrMapOvr>
-</p:sld>
-</file>
-
-<file path=ppt/slides/slide57.xml><?xml version="1.0" encoding="utf-8"?>
-<p:sld xmlns:a="http://schemas.openxmlformats.org/drawingml/2006/main" xmlns:r="http://schemas.openxmlformats.org/officeDocument/2006/relationships" xmlns:p="http://schemas.openxmlformats.org/presentationml/2006/main">
-  <p:cSld>
-    <p:spTree>
-      <p:nvGrpSpPr>
-        <p:cNvPr id="1" name=""/>
-        <p:cNvGrpSpPr/>
-        <p:nvPr/>
-      </p:nvGrpSpPr>
-      <p:grpSpPr>
-        <a:xfrm>
-          <a:off x="0" y="0"/>
-          <a:ext cx="0" cy="0"/>
-          <a:chOff x="0" y="0"/>
-          <a:chExt cx="0" cy="0"/>
-        </a:xfrm>
-      </p:grpSpPr>
-      <p:pic>
-        <p:nvPicPr>
-          <p:cNvPr id="4" name="Grafik 3">
-            <a:extLst>
-              <a:ext uri="{FF2B5EF4-FFF2-40B4-BE49-F238E27FC236}">
-                <a16:creationId xmlns:a16="http://schemas.microsoft.com/office/drawing/2014/main" id="{36D057A0-2A72-40C2-915F-397D949AE212}"/>
-              </a:ext>
-            </a:extLst>
-          </p:cNvPr>
-          <p:cNvPicPr>
-            <a:picLocks noChangeAspect="1"/>
-          </p:cNvPicPr>
-          <p:nvPr/>
-        </p:nvPicPr>
-        <p:blipFill>
-          <a:blip r:embed="rId2"/>
-          <a:stretch>
-            <a:fillRect/>
-          </a:stretch>
-        </p:blipFill>
-        <p:spPr>
-          <a:xfrm>
-            <a:off x="1889911" y="1399654"/>
-            <a:ext cx="5572125" cy="3648075"/>
-          </a:xfrm>
-          <a:prstGeom prst="rect">
-            <a:avLst/>
-          </a:prstGeom>
-        </p:spPr>
-      </p:pic>
-      <p:sp>
-        <p:nvSpPr>
-          <p:cNvPr id="2" name="Textplatzhalter 1">
-            <a:extLst>
-              <a:ext uri="{FF2B5EF4-FFF2-40B4-BE49-F238E27FC236}">
-                <a16:creationId xmlns:a16="http://schemas.microsoft.com/office/drawing/2014/main" id="{7392AB59-3228-49AE-A52D-E42A91049C9A}"/>
-              </a:ext>
-            </a:extLst>
-          </p:cNvPr>
-          <p:cNvSpPr>
-            <a:spLocks noGrp="1"/>
-          </p:cNvSpPr>
-          <p:nvPr>
-            <p:ph type="body" sz="quarter" idx="13"/>
-          </p:nvPr>
-        </p:nvSpPr>
-        <p:spPr/>
-        <p:txBody>
-          <a:bodyPr/>
-          <a:lstStyle/>
-          <a:p>
-            <a:r>
-              <a:rPr lang="de-DE" dirty="0"/>
-              <a:t>Loss-Funktion</a:t>
-            </a:r>
-          </a:p>
-        </p:txBody>
-      </p:sp>
-      <p:sp>
-        <p:nvSpPr>
-          <p:cNvPr id="5" name="Titel 4">
-            <a:extLst>
-              <a:ext uri="{FF2B5EF4-FFF2-40B4-BE49-F238E27FC236}">
-                <a16:creationId xmlns:a16="http://schemas.microsoft.com/office/drawing/2014/main" id="{74E4A57E-0607-4673-96C4-F7DB6A319F5D}"/>
-              </a:ext>
-            </a:extLst>
-          </p:cNvPr>
-          <p:cNvSpPr>
-            <a:spLocks noGrp="1"/>
-          </p:cNvSpPr>
-          <p:nvPr>
-            <p:ph type="title"/>
-          </p:nvPr>
-        </p:nvSpPr>
-        <p:spPr/>
-        <p:txBody>
-          <a:bodyPr/>
-          <a:lstStyle/>
-          <a:p>
-            <a:r>
-              <a:rPr lang="de-DE" dirty="0"/>
-              <a:t>Klassifizierung von </a:t>
-            </a:r>
-            <a:r>
-              <a:rPr lang="de-DE" dirty="0" err="1"/>
-              <a:t>sdss</a:t>
-            </a:r>
-            <a:r>
-              <a:rPr lang="de-DE" dirty="0"/>
-              <a:t> </a:t>
-            </a:r>
-            <a:r>
-              <a:rPr lang="de-DE" dirty="0" err="1"/>
-              <a:t>spektraldaten</a:t>
-            </a:r>
-            <a:endParaRPr lang="de-DE" dirty="0"/>
-          </a:p>
-        </p:txBody>
-      </p:sp>
-      <p:sp>
-        <p:nvSpPr>
-          <p:cNvPr id="6" name="Datumsplatzhalter 5">
-            <a:extLst>
-              <a:ext uri="{FF2B5EF4-FFF2-40B4-BE49-F238E27FC236}">
-                <a16:creationId xmlns:a16="http://schemas.microsoft.com/office/drawing/2014/main" id="{77B4D1AA-144E-490F-9377-B2EF1FC6C7C1}"/>
-              </a:ext>
-            </a:extLst>
-          </p:cNvPr>
-          <p:cNvSpPr>
-            <a:spLocks noGrp="1"/>
-          </p:cNvSpPr>
-          <p:nvPr>
-            <p:ph type="dt" sz="half" idx="17"/>
-          </p:nvPr>
-        </p:nvSpPr>
-        <p:spPr/>
-        <p:txBody>
-          <a:bodyPr/>
-          <a:lstStyle/>
-          <a:p>
-            <a:r>
-              <a:rPr lang="de-DE"/>
-              <a:t>24.08.2021</a:t>
-            </a:r>
-          </a:p>
-        </p:txBody>
-      </p:sp>
-      <p:sp>
-        <p:nvSpPr>
-          <p:cNvPr id="7" name="Fußzeilenplatzhalter 6">
-            <a:extLst>
-              <a:ext uri="{FF2B5EF4-FFF2-40B4-BE49-F238E27FC236}">
-                <a16:creationId xmlns:a16="http://schemas.microsoft.com/office/drawing/2014/main" id="{B5FBB1D4-60FC-4BDD-AC38-B0E5F577CC02}"/>
-              </a:ext>
-            </a:extLst>
-          </p:cNvPr>
-          <p:cNvSpPr>
-            <a:spLocks noGrp="1"/>
-          </p:cNvSpPr>
-          <p:nvPr>
-            <p:ph type="ftr" sz="quarter" idx="18"/>
-          </p:nvPr>
-        </p:nvSpPr>
-        <p:spPr/>
-        <p:txBody>
-          <a:bodyPr/>
-          <a:lstStyle/>
-          <a:p>
-            <a:r>
-              <a:rPr lang="de-DE" dirty="0">
-                <a:latin typeface="TheSans UHH Bold Caps"/>
-                <a:cs typeface="TheSans UHH Bold Caps"/>
-              </a:rPr>
-              <a:t>Machine Learning</a:t>
-            </a:r>
-            <a:endParaRPr lang="de-DE" dirty="0"/>
-          </a:p>
-        </p:txBody>
-      </p:sp>
-      <p:sp>
-        <p:nvSpPr>
-          <p:cNvPr id="8" name="Foliennummernplatzhalter 7">
-            <a:extLst>
-              <a:ext uri="{FF2B5EF4-FFF2-40B4-BE49-F238E27FC236}">
-                <a16:creationId xmlns:a16="http://schemas.microsoft.com/office/drawing/2014/main" id="{85BB1F78-1A54-49AD-B7E7-5F8D1A86CD45}"/>
-              </a:ext>
-            </a:extLst>
-          </p:cNvPr>
-          <p:cNvSpPr>
-            <a:spLocks noGrp="1"/>
-          </p:cNvSpPr>
-          <p:nvPr>
-            <p:ph type="sldNum" sz="quarter" idx="19"/>
-          </p:nvPr>
-        </p:nvSpPr>
-        <p:spPr/>
-        <p:txBody>
-          <a:bodyPr/>
-          <a:lstStyle/>
-          <a:p>
-            <a:fld id="{3E01A2B2-10AD-754B-9B4C-E5B6FED423D0}" type="slidenum">
-              <a:rPr lang="de-DE" smtClean="0"/>
-              <a:pPr/>
-              <a:t>57</a:t>
-            </a:fld>
-            <a:endParaRPr lang="de-DE"/>
-          </a:p>
-        </p:txBody>
-      </p:sp>
-    </p:spTree>
-    <p:extLst>
-      <p:ext uri="{BB962C8B-B14F-4D97-AF65-F5344CB8AC3E}">
-        <p14:creationId xmlns:p14="http://schemas.microsoft.com/office/powerpoint/2010/main" val="2235481521"/>
       </p:ext>
     </p:extLst>
   </p:cSld>
@@ -20911,12 +21057,42 @@
           <a:chExt cx="0" cy="0"/>
         </a:xfrm>
       </p:grpSpPr>
+      <p:pic>
+        <p:nvPicPr>
+          <p:cNvPr id="4" name="Grafik 3">
+            <a:extLst>
+              <a:ext uri="{FF2B5EF4-FFF2-40B4-BE49-F238E27FC236}">
+                <a16:creationId xmlns:a16="http://schemas.microsoft.com/office/drawing/2014/main" id="{36D057A0-2A72-40C2-915F-397D949AE212}"/>
+              </a:ext>
+            </a:extLst>
+          </p:cNvPr>
+          <p:cNvPicPr>
+            <a:picLocks noChangeAspect="1"/>
+          </p:cNvPicPr>
+          <p:nvPr/>
+        </p:nvPicPr>
+        <p:blipFill>
+          <a:blip r:embed="rId2"/>
+          <a:stretch>
+            <a:fillRect/>
+          </a:stretch>
+        </p:blipFill>
+        <p:spPr>
+          <a:xfrm>
+            <a:off x="1889911" y="1399654"/>
+            <a:ext cx="5572125" cy="3648075"/>
+          </a:xfrm>
+          <a:prstGeom prst="rect">
+            <a:avLst/>
+          </a:prstGeom>
+        </p:spPr>
+      </p:pic>
       <p:sp>
         <p:nvSpPr>
           <p:cNvPr id="2" name="Textplatzhalter 1">
             <a:extLst>
               <a:ext uri="{FF2B5EF4-FFF2-40B4-BE49-F238E27FC236}">
-                <a16:creationId xmlns:a16="http://schemas.microsoft.com/office/drawing/2014/main" id="{10EA7EB5-6276-499E-861B-94F6A6F3E367}"/>
+                <a16:creationId xmlns:a16="http://schemas.microsoft.com/office/drawing/2014/main" id="{7392AB59-3228-49AE-A52D-E42A91049C9A}"/>
               </a:ext>
             </a:extLst>
           </p:cNvPr>
@@ -20933,18 +21109,9 @@
           <a:lstStyle/>
           <a:p>
             <a:r>
-              <a:rPr lang="de-DE" dirty="0" err="1"/>
-              <a:t>zwarning</a:t>
-            </a:r>
-            <a:r>
-              <a:rPr lang="de-DE" dirty="0"/>
-              <a:t> </a:t>
-            </a:r>
-            <a:r>
-              <a:rPr lang="de-DE" dirty="0" err="1"/>
-              <a:t>flags</a:t>
-            </a:r>
-            <a:endParaRPr lang="de-DE" dirty="0"/>
+              <a:rPr lang="de-DE" dirty="0"/>
+              <a:t>Loss-Funktion</a:t>
+            </a:r>
           </a:p>
         </p:txBody>
       </p:sp>
@@ -20953,7 +21120,7 @@
           <p:cNvPr id="5" name="Titel 4">
             <a:extLst>
               <a:ext uri="{FF2B5EF4-FFF2-40B4-BE49-F238E27FC236}">
-                <a16:creationId xmlns:a16="http://schemas.microsoft.com/office/drawing/2014/main" id="{6E979286-F609-4ACC-B8DB-26C576884A30}"/>
+                <a16:creationId xmlns:a16="http://schemas.microsoft.com/office/drawing/2014/main" id="{74E4A57E-0607-4673-96C4-F7DB6A319F5D}"/>
               </a:ext>
             </a:extLst>
           </p:cNvPr>
@@ -20994,7 +21161,7 @@
           <p:cNvPr id="6" name="Datumsplatzhalter 5">
             <a:extLst>
               <a:ext uri="{FF2B5EF4-FFF2-40B4-BE49-F238E27FC236}">
-                <a16:creationId xmlns:a16="http://schemas.microsoft.com/office/drawing/2014/main" id="{D1EF2313-D269-47C5-8112-F276F20FEB1F}"/>
+                <a16:creationId xmlns:a16="http://schemas.microsoft.com/office/drawing/2014/main" id="{77B4D1AA-144E-490F-9377-B2EF1FC6C7C1}"/>
               </a:ext>
             </a:extLst>
           </p:cNvPr>
@@ -21022,7 +21189,7 @@
           <p:cNvPr id="7" name="Fußzeilenplatzhalter 6">
             <a:extLst>
               <a:ext uri="{FF2B5EF4-FFF2-40B4-BE49-F238E27FC236}">
-                <a16:creationId xmlns:a16="http://schemas.microsoft.com/office/drawing/2014/main" id="{5737A431-BC39-4389-8025-8B0F018EEE37}"/>
+                <a16:creationId xmlns:a16="http://schemas.microsoft.com/office/drawing/2014/main" id="{B5FBB1D4-60FC-4BDD-AC38-B0E5F577CC02}"/>
               </a:ext>
             </a:extLst>
           </p:cNvPr>
@@ -21054,7 +21221,7 @@
           <p:cNvPr id="8" name="Foliennummernplatzhalter 7">
             <a:extLst>
               <a:ext uri="{FF2B5EF4-FFF2-40B4-BE49-F238E27FC236}">
-                <a16:creationId xmlns:a16="http://schemas.microsoft.com/office/drawing/2014/main" id="{5CE014DD-359F-4EA9-B545-8F76316A8675}"/>
+                <a16:creationId xmlns:a16="http://schemas.microsoft.com/office/drawing/2014/main" id="{85BB1F78-1A54-49AD-B7E7-5F8D1A86CD45}"/>
               </a:ext>
             </a:extLst>
           </p:cNvPr>
@@ -21074,6 +21241,204 @@
               <a:rPr lang="de-DE" smtClean="0"/>
               <a:pPr/>
               <a:t>58</a:t>
+            </a:fld>
+            <a:endParaRPr lang="de-DE"/>
+          </a:p>
+        </p:txBody>
+      </p:sp>
+    </p:spTree>
+    <p:extLst>
+      <p:ext uri="{BB962C8B-B14F-4D97-AF65-F5344CB8AC3E}">
+        <p14:creationId xmlns:p14="http://schemas.microsoft.com/office/powerpoint/2010/main" val="2235481521"/>
+      </p:ext>
+    </p:extLst>
+  </p:cSld>
+  <p:clrMapOvr>
+    <a:masterClrMapping/>
+  </p:clrMapOvr>
+</p:sld>
+</file>
+
+<file path=ppt/slides/slide59.xml><?xml version="1.0" encoding="utf-8"?>
+<p:sld xmlns:a="http://schemas.openxmlformats.org/drawingml/2006/main" xmlns:r="http://schemas.openxmlformats.org/officeDocument/2006/relationships" xmlns:p="http://schemas.openxmlformats.org/presentationml/2006/main">
+  <p:cSld>
+    <p:spTree>
+      <p:nvGrpSpPr>
+        <p:cNvPr id="1" name=""/>
+        <p:cNvGrpSpPr/>
+        <p:nvPr/>
+      </p:nvGrpSpPr>
+      <p:grpSpPr>
+        <a:xfrm>
+          <a:off x="0" y="0"/>
+          <a:ext cx="0" cy="0"/>
+          <a:chOff x="0" y="0"/>
+          <a:chExt cx="0" cy="0"/>
+        </a:xfrm>
+      </p:grpSpPr>
+      <p:sp>
+        <p:nvSpPr>
+          <p:cNvPr id="2" name="Textplatzhalter 1">
+            <a:extLst>
+              <a:ext uri="{FF2B5EF4-FFF2-40B4-BE49-F238E27FC236}">
+                <a16:creationId xmlns:a16="http://schemas.microsoft.com/office/drawing/2014/main" id="{10EA7EB5-6276-499E-861B-94F6A6F3E367}"/>
+              </a:ext>
+            </a:extLst>
+          </p:cNvPr>
+          <p:cNvSpPr>
+            <a:spLocks noGrp="1"/>
+          </p:cNvSpPr>
+          <p:nvPr>
+            <p:ph type="body" sz="quarter" idx="13"/>
+          </p:nvPr>
+        </p:nvSpPr>
+        <p:spPr/>
+        <p:txBody>
+          <a:bodyPr/>
+          <a:lstStyle/>
+          <a:p>
+            <a:r>
+              <a:rPr lang="de-DE" dirty="0" err="1"/>
+              <a:t>zwarning</a:t>
+            </a:r>
+            <a:r>
+              <a:rPr lang="de-DE" dirty="0"/>
+              <a:t> </a:t>
+            </a:r>
+            <a:r>
+              <a:rPr lang="de-DE" dirty="0" err="1"/>
+              <a:t>flags</a:t>
+            </a:r>
+            <a:endParaRPr lang="de-DE" dirty="0"/>
+          </a:p>
+        </p:txBody>
+      </p:sp>
+      <p:sp>
+        <p:nvSpPr>
+          <p:cNvPr id="5" name="Titel 4">
+            <a:extLst>
+              <a:ext uri="{FF2B5EF4-FFF2-40B4-BE49-F238E27FC236}">
+                <a16:creationId xmlns:a16="http://schemas.microsoft.com/office/drawing/2014/main" id="{6E979286-F609-4ACC-B8DB-26C576884A30}"/>
+              </a:ext>
+            </a:extLst>
+          </p:cNvPr>
+          <p:cNvSpPr>
+            <a:spLocks noGrp="1"/>
+          </p:cNvSpPr>
+          <p:nvPr>
+            <p:ph type="title"/>
+          </p:nvPr>
+        </p:nvSpPr>
+        <p:spPr/>
+        <p:txBody>
+          <a:bodyPr/>
+          <a:lstStyle/>
+          <a:p>
+            <a:r>
+              <a:rPr lang="de-DE" dirty="0"/>
+              <a:t>Klassifizierung von </a:t>
+            </a:r>
+            <a:r>
+              <a:rPr lang="de-DE" dirty="0" err="1"/>
+              <a:t>sdss</a:t>
+            </a:r>
+            <a:r>
+              <a:rPr lang="de-DE" dirty="0"/>
+              <a:t> </a:t>
+            </a:r>
+            <a:r>
+              <a:rPr lang="de-DE" dirty="0" err="1"/>
+              <a:t>spektraldaten</a:t>
+            </a:r>
+            <a:endParaRPr lang="de-DE" dirty="0"/>
+          </a:p>
+        </p:txBody>
+      </p:sp>
+      <p:sp>
+        <p:nvSpPr>
+          <p:cNvPr id="6" name="Datumsplatzhalter 5">
+            <a:extLst>
+              <a:ext uri="{FF2B5EF4-FFF2-40B4-BE49-F238E27FC236}">
+                <a16:creationId xmlns:a16="http://schemas.microsoft.com/office/drawing/2014/main" id="{D1EF2313-D269-47C5-8112-F276F20FEB1F}"/>
+              </a:ext>
+            </a:extLst>
+          </p:cNvPr>
+          <p:cNvSpPr>
+            <a:spLocks noGrp="1"/>
+          </p:cNvSpPr>
+          <p:nvPr>
+            <p:ph type="dt" sz="half" idx="17"/>
+          </p:nvPr>
+        </p:nvSpPr>
+        <p:spPr/>
+        <p:txBody>
+          <a:bodyPr/>
+          <a:lstStyle/>
+          <a:p>
+            <a:r>
+              <a:rPr lang="de-DE"/>
+              <a:t>24.08.2021</a:t>
+            </a:r>
+          </a:p>
+        </p:txBody>
+      </p:sp>
+      <p:sp>
+        <p:nvSpPr>
+          <p:cNvPr id="7" name="Fußzeilenplatzhalter 6">
+            <a:extLst>
+              <a:ext uri="{FF2B5EF4-FFF2-40B4-BE49-F238E27FC236}">
+                <a16:creationId xmlns:a16="http://schemas.microsoft.com/office/drawing/2014/main" id="{5737A431-BC39-4389-8025-8B0F018EEE37}"/>
+              </a:ext>
+            </a:extLst>
+          </p:cNvPr>
+          <p:cNvSpPr>
+            <a:spLocks noGrp="1"/>
+          </p:cNvSpPr>
+          <p:nvPr>
+            <p:ph type="ftr" sz="quarter" idx="18"/>
+          </p:nvPr>
+        </p:nvSpPr>
+        <p:spPr/>
+        <p:txBody>
+          <a:bodyPr/>
+          <a:lstStyle/>
+          <a:p>
+            <a:r>
+              <a:rPr lang="de-DE" dirty="0">
+                <a:latin typeface="TheSans UHH Bold Caps"/>
+                <a:cs typeface="TheSans UHH Bold Caps"/>
+              </a:rPr>
+              <a:t>Machine Learning</a:t>
+            </a:r>
+            <a:endParaRPr lang="de-DE" dirty="0"/>
+          </a:p>
+        </p:txBody>
+      </p:sp>
+      <p:sp>
+        <p:nvSpPr>
+          <p:cNvPr id="8" name="Foliennummernplatzhalter 7">
+            <a:extLst>
+              <a:ext uri="{FF2B5EF4-FFF2-40B4-BE49-F238E27FC236}">
+                <a16:creationId xmlns:a16="http://schemas.microsoft.com/office/drawing/2014/main" id="{5CE014DD-359F-4EA9-B545-8F76316A8675}"/>
+              </a:ext>
+            </a:extLst>
+          </p:cNvPr>
+          <p:cNvSpPr>
+            <a:spLocks noGrp="1"/>
+          </p:cNvSpPr>
+          <p:nvPr>
+            <p:ph type="sldNum" sz="quarter" idx="19"/>
+          </p:nvPr>
+        </p:nvSpPr>
+        <p:spPr/>
+        <p:txBody>
+          <a:bodyPr/>
+          <a:lstStyle/>
+          <a:p>
+            <a:fld id="{3E01A2B2-10AD-754B-9B4C-E5B6FED423D0}" type="slidenum">
+              <a:rPr lang="de-DE" smtClean="0"/>
+              <a:pPr/>
+              <a:t>59</a:t>
             </a:fld>
             <a:endParaRPr lang="de-DE"/>
           </a:p>
@@ -21122,287 +21487,6 @@
 </p:sld>
 </file>
 
-<file path=ppt/slides/slide59.xml><?xml version="1.0" encoding="utf-8"?>
-<p:sld xmlns:a="http://schemas.openxmlformats.org/drawingml/2006/main" xmlns:r="http://schemas.openxmlformats.org/officeDocument/2006/relationships" xmlns:p="http://schemas.openxmlformats.org/presentationml/2006/main">
-  <p:cSld>
-    <p:spTree>
-      <p:nvGrpSpPr>
-        <p:cNvPr id="1" name=""/>
-        <p:cNvGrpSpPr/>
-        <p:nvPr/>
-      </p:nvGrpSpPr>
-      <p:grpSpPr>
-        <a:xfrm>
-          <a:off x="0" y="0"/>
-          <a:ext cx="0" cy="0"/>
-          <a:chOff x="0" y="0"/>
-          <a:chExt cx="0" cy="0"/>
-        </a:xfrm>
-      </p:grpSpPr>
-      <p:sp>
-        <p:nvSpPr>
-          <p:cNvPr id="2" name="Textplatzhalter 1">
-            <a:extLst>
-              <a:ext uri="{FF2B5EF4-FFF2-40B4-BE49-F238E27FC236}">
-                <a16:creationId xmlns:a16="http://schemas.microsoft.com/office/drawing/2014/main" id="{FDA7A463-4497-4A33-BF23-432799227BE4}"/>
-              </a:ext>
-            </a:extLst>
-          </p:cNvPr>
-          <p:cNvSpPr>
-            <a:spLocks noGrp="1"/>
-          </p:cNvSpPr>
-          <p:nvPr>
-            <p:ph type="body" sz="quarter" idx="13"/>
-          </p:nvPr>
-        </p:nvSpPr>
-        <p:spPr/>
-        <p:txBody>
-          <a:bodyPr/>
-          <a:lstStyle/>
-          <a:p>
-            <a:r>
-              <a:rPr lang="de-DE" dirty="0"/>
-              <a:t>Goldener </a:t>
-            </a:r>
-            <a:r>
-              <a:rPr lang="de-DE" dirty="0" err="1"/>
-              <a:t>datensatz</a:t>
-            </a:r>
-            <a:endParaRPr lang="de-DE" dirty="0"/>
-          </a:p>
-        </p:txBody>
-      </p:sp>
-      <p:sp>
-        <p:nvSpPr>
-          <p:cNvPr id="3" name="Textplatzhalter 2">
-            <a:extLst>
-              <a:ext uri="{FF2B5EF4-FFF2-40B4-BE49-F238E27FC236}">
-                <a16:creationId xmlns:a16="http://schemas.microsoft.com/office/drawing/2014/main" id="{96F76A86-53A1-4509-8DF4-5DCF167CC703}"/>
-              </a:ext>
-            </a:extLst>
-          </p:cNvPr>
-          <p:cNvSpPr>
-            <a:spLocks noGrp="1"/>
-          </p:cNvSpPr>
-          <p:nvPr>
-            <p:ph type="body" sz="quarter" idx="14"/>
-          </p:nvPr>
-        </p:nvSpPr>
-        <p:spPr>
-          <a:xfrm>
-            <a:off x="214770" y="1779662"/>
-            <a:ext cx="6949518" cy="2880320"/>
-          </a:xfrm>
-        </p:spPr>
-        <p:txBody>
-          <a:bodyPr/>
-          <a:lstStyle/>
-          <a:p>
-            <a:pPr marL="342900" indent="-342900">
-              <a:buFont typeface="Arial" panose="020B0604020202020204" pitchFamily="34" charset="0"/>
-              <a:buChar char="•"/>
-            </a:pPr>
-            <a:r>
-              <a:rPr lang="de-DE" dirty="0"/>
-              <a:t>Fast die Hälfte der falsch Klassifizierten Daten hatten keinen </a:t>
-            </a:r>
-            <a:r>
-              <a:rPr lang="de-DE" dirty="0" err="1"/>
-              <a:t>zWarning-Flag</a:t>
-            </a:r>
-            <a:r>
-              <a:rPr lang="de-DE" dirty="0"/>
-              <a:t> = 0</a:t>
-            </a:r>
-          </a:p>
-          <a:p>
-            <a:pPr marL="342900" indent="-342900">
-              <a:buFont typeface="Arial" panose="020B0604020202020204" pitchFamily="34" charset="0"/>
-              <a:buChar char="•"/>
-            </a:pPr>
-            <a:endParaRPr lang="de-DE" dirty="0"/>
-          </a:p>
-          <a:p>
-            <a:pPr marL="342900" indent="-342900">
-              <a:buFont typeface="Arial" panose="020B0604020202020204" pitchFamily="34" charset="0"/>
-              <a:buChar char="•"/>
-            </a:pPr>
-            <a:r>
-              <a:rPr lang="de-DE" dirty="0"/>
-              <a:t>Neuer goldener Datensatz mit ausschließlich Spektren mit </a:t>
-            </a:r>
-            <a:r>
-              <a:rPr lang="de-DE" dirty="0" err="1"/>
-              <a:t>zWarning-Flag</a:t>
-            </a:r>
-            <a:r>
-              <a:rPr lang="de-DE" dirty="0"/>
-              <a:t> = 0 in SQL-Suche</a:t>
-            </a:r>
-          </a:p>
-          <a:p>
-            <a:pPr marL="342900" indent="-342900">
-              <a:buFont typeface="Arial" panose="020B0604020202020204" pitchFamily="34" charset="0"/>
-              <a:buChar char="•"/>
-            </a:pPr>
-            <a:endParaRPr lang="de-DE" dirty="0"/>
-          </a:p>
-          <a:p>
-            <a:pPr marL="342900" indent="-342900">
-              <a:buFont typeface="Arial" panose="020B0604020202020204" pitchFamily="34" charset="0"/>
-              <a:buChar char="•"/>
-            </a:pPr>
-            <a:r>
-              <a:rPr lang="de-DE" dirty="0"/>
-              <a:t>Verbessert Training deutlich!</a:t>
-            </a:r>
-          </a:p>
-        </p:txBody>
-      </p:sp>
-      <p:sp>
-        <p:nvSpPr>
-          <p:cNvPr id="5" name="Titel 4">
-            <a:extLst>
-              <a:ext uri="{FF2B5EF4-FFF2-40B4-BE49-F238E27FC236}">
-                <a16:creationId xmlns:a16="http://schemas.microsoft.com/office/drawing/2014/main" id="{8685DC7A-C157-48AA-83CF-330F16936B1D}"/>
-              </a:ext>
-            </a:extLst>
-          </p:cNvPr>
-          <p:cNvSpPr>
-            <a:spLocks noGrp="1"/>
-          </p:cNvSpPr>
-          <p:nvPr>
-            <p:ph type="title"/>
-          </p:nvPr>
-        </p:nvSpPr>
-        <p:spPr/>
-        <p:txBody>
-          <a:bodyPr/>
-          <a:lstStyle/>
-          <a:p>
-            <a:r>
-              <a:rPr lang="de-DE" dirty="0"/>
-              <a:t>Klassifizierung von </a:t>
-            </a:r>
-            <a:r>
-              <a:rPr lang="de-DE" dirty="0" err="1"/>
-              <a:t>sdss</a:t>
-            </a:r>
-            <a:r>
-              <a:rPr lang="de-DE" dirty="0"/>
-              <a:t> </a:t>
-            </a:r>
-            <a:r>
-              <a:rPr lang="de-DE" dirty="0" err="1"/>
-              <a:t>spektraldaten</a:t>
-            </a:r>
-            <a:endParaRPr lang="de-DE" dirty="0"/>
-          </a:p>
-        </p:txBody>
-      </p:sp>
-      <p:sp>
-        <p:nvSpPr>
-          <p:cNvPr id="6" name="Datumsplatzhalter 5">
-            <a:extLst>
-              <a:ext uri="{FF2B5EF4-FFF2-40B4-BE49-F238E27FC236}">
-                <a16:creationId xmlns:a16="http://schemas.microsoft.com/office/drawing/2014/main" id="{1F9DFD61-43EB-4AA4-8660-90277BC9C9D5}"/>
-              </a:ext>
-            </a:extLst>
-          </p:cNvPr>
-          <p:cNvSpPr>
-            <a:spLocks noGrp="1"/>
-          </p:cNvSpPr>
-          <p:nvPr>
-            <p:ph type="dt" sz="half" idx="17"/>
-          </p:nvPr>
-        </p:nvSpPr>
-        <p:spPr/>
-        <p:txBody>
-          <a:bodyPr/>
-          <a:lstStyle/>
-          <a:p>
-            <a:r>
-              <a:rPr lang="de-DE"/>
-              <a:t>24.08.2021</a:t>
-            </a:r>
-          </a:p>
-        </p:txBody>
-      </p:sp>
-      <p:sp>
-        <p:nvSpPr>
-          <p:cNvPr id="7" name="Fußzeilenplatzhalter 6">
-            <a:extLst>
-              <a:ext uri="{FF2B5EF4-FFF2-40B4-BE49-F238E27FC236}">
-                <a16:creationId xmlns:a16="http://schemas.microsoft.com/office/drawing/2014/main" id="{264F4936-8E92-4713-8CB1-454BE208860A}"/>
-              </a:ext>
-            </a:extLst>
-          </p:cNvPr>
-          <p:cNvSpPr>
-            <a:spLocks noGrp="1"/>
-          </p:cNvSpPr>
-          <p:nvPr>
-            <p:ph type="ftr" sz="quarter" idx="18"/>
-          </p:nvPr>
-        </p:nvSpPr>
-        <p:spPr/>
-        <p:txBody>
-          <a:bodyPr/>
-          <a:lstStyle/>
-          <a:p>
-            <a:r>
-              <a:rPr lang="de-DE" dirty="0">
-                <a:latin typeface="TheSans UHH Bold Caps"/>
-                <a:cs typeface="TheSans UHH Bold Caps"/>
-              </a:rPr>
-              <a:t>Machine Learning</a:t>
-            </a:r>
-            <a:endParaRPr lang="de-DE" dirty="0"/>
-          </a:p>
-        </p:txBody>
-      </p:sp>
-      <p:sp>
-        <p:nvSpPr>
-          <p:cNvPr id="8" name="Foliennummernplatzhalter 7">
-            <a:extLst>
-              <a:ext uri="{FF2B5EF4-FFF2-40B4-BE49-F238E27FC236}">
-                <a16:creationId xmlns:a16="http://schemas.microsoft.com/office/drawing/2014/main" id="{F9BDED70-CC28-4881-95FC-093411DD3B55}"/>
-              </a:ext>
-            </a:extLst>
-          </p:cNvPr>
-          <p:cNvSpPr>
-            <a:spLocks noGrp="1"/>
-          </p:cNvSpPr>
-          <p:nvPr>
-            <p:ph type="sldNum" sz="quarter" idx="19"/>
-          </p:nvPr>
-        </p:nvSpPr>
-        <p:spPr/>
-        <p:txBody>
-          <a:bodyPr/>
-          <a:lstStyle/>
-          <a:p>
-            <a:fld id="{3E01A2B2-10AD-754B-9B4C-E5B6FED423D0}" type="slidenum">
-              <a:rPr lang="de-DE" smtClean="0"/>
-              <a:pPr/>
-              <a:t>59</a:t>
-            </a:fld>
-            <a:endParaRPr lang="de-DE"/>
-          </a:p>
-        </p:txBody>
-      </p:sp>
-    </p:spTree>
-    <p:extLst>
-      <p:ext uri="{BB962C8B-B14F-4D97-AF65-F5344CB8AC3E}">
-        <p14:creationId xmlns:p14="http://schemas.microsoft.com/office/powerpoint/2010/main" val="1302608309"/>
-      </p:ext>
-    </p:extLst>
-  </p:cSld>
-  <p:clrMapOvr>
-    <a:masterClrMapping/>
-  </p:clrMapOvr>
-</p:sld>
-</file>
-
 <file path=ppt/slides/slide6.xml><?xml version="1.0" encoding="utf-8"?>
 <p:sld xmlns:a="http://schemas.openxmlformats.org/drawingml/2006/main" xmlns:r="http://schemas.openxmlformats.org/officeDocument/2006/relationships" xmlns:p="http://schemas.openxmlformats.org/presentationml/2006/main">
   <p:cSld>
@@ -21711,65 +21795,122 @@
           <a:chExt cx="0" cy="0"/>
         </a:xfrm>
       </p:grpSpPr>
-      <p:pic>
-        <p:nvPicPr>
-          <p:cNvPr id="10" name="Grafik 9">
-            <a:extLst>
-              <a:ext uri="{FF2B5EF4-FFF2-40B4-BE49-F238E27FC236}">
-                <a16:creationId xmlns:a16="http://schemas.microsoft.com/office/drawing/2014/main" id="{6CEE6EF5-B045-4A95-A69F-09472E12E307}"/>
-              </a:ext>
-            </a:extLst>
-          </p:cNvPr>
-          <p:cNvPicPr>
-            <a:picLocks noChangeAspect="1"/>
-          </p:cNvPicPr>
-          <p:nvPr/>
-        </p:nvPicPr>
-        <p:blipFill>
-          <a:blip r:embed="rId2"/>
-          <a:stretch>
-            <a:fillRect/>
-          </a:stretch>
-        </p:blipFill>
+      <p:sp>
+        <p:nvSpPr>
+          <p:cNvPr id="2" name="Textplatzhalter 1">
+            <a:extLst>
+              <a:ext uri="{FF2B5EF4-FFF2-40B4-BE49-F238E27FC236}">
+                <a16:creationId xmlns:a16="http://schemas.microsoft.com/office/drawing/2014/main" id="{FDA7A463-4497-4A33-BF23-432799227BE4}"/>
+              </a:ext>
+            </a:extLst>
+          </p:cNvPr>
+          <p:cNvSpPr>
+            <a:spLocks noGrp="1"/>
+          </p:cNvSpPr>
+          <p:nvPr>
+            <p:ph type="body" sz="quarter" idx="13"/>
+          </p:nvPr>
+        </p:nvSpPr>
+        <p:spPr/>
+        <p:txBody>
+          <a:bodyPr/>
+          <a:lstStyle/>
+          <a:p>
+            <a:r>
+              <a:rPr lang="de-DE" dirty="0"/>
+              <a:t>Goldener </a:t>
+            </a:r>
+            <a:r>
+              <a:rPr lang="de-DE" dirty="0" err="1"/>
+              <a:t>datensatz</a:t>
+            </a:r>
+            <a:endParaRPr lang="de-DE" dirty="0"/>
+          </a:p>
+        </p:txBody>
+      </p:sp>
+      <p:sp>
+        <p:nvSpPr>
+          <p:cNvPr id="3" name="Textplatzhalter 2">
+            <a:extLst>
+              <a:ext uri="{FF2B5EF4-FFF2-40B4-BE49-F238E27FC236}">
+                <a16:creationId xmlns:a16="http://schemas.microsoft.com/office/drawing/2014/main" id="{96F76A86-53A1-4509-8DF4-5DCF167CC703}"/>
+              </a:ext>
+            </a:extLst>
+          </p:cNvPr>
+          <p:cNvSpPr>
+            <a:spLocks noGrp="1"/>
+          </p:cNvSpPr>
+          <p:nvPr>
+            <p:ph type="body" sz="quarter" idx="14"/>
+          </p:nvPr>
+        </p:nvSpPr>
         <p:spPr>
           <a:xfrm>
-            <a:off x="2051720" y="1483762"/>
-            <a:ext cx="5194008" cy="3672686"/>
-          </a:xfrm>
-          <a:prstGeom prst="rect">
-            <a:avLst/>
-          </a:prstGeom>
-        </p:spPr>
-      </p:pic>
-      <p:sp>
-        <p:nvSpPr>
-          <p:cNvPr id="2" name="Textplatzhalter 1">
-            <a:extLst>
-              <a:ext uri="{FF2B5EF4-FFF2-40B4-BE49-F238E27FC236}">
-                <a16:creationId xmlns:a16="http://schemas.microsoft.com/office/drawing/2014/main" id="{23898163-0C45-43FD-AA1B-70702E754DCF}"/>
-              </a:ext>
-            </a:extLst>
-          </p:cNvPr>
-          <p:cNvSpPr>
-            <a:spLocks noGrp="1"/>
-          </p:cNvSpPr>
-          <p:nvPr>
-            <p:ph type="body" sz="quarter" idx="13"/>
-          </p:nvPr>
-        </p:nvSpPr>
-        <p:spPr>
-          <a:xfrm>
-            <a:off x="214769" y="1040897"/>
-            <a:ext cx="8353425" cy="503882"/>
+            <a:off x="214770" y="1779662"/>
+            <a:ext cx="6949518" cy="2880320"/>
           </a:xfrm>
         </p:spPr>
         <p:txBody>
           <a:bodyPr/>
           <a:lstStyle/>
           <a:p>
-            <a:r>
-              <a:rPr lang="de-DE" dirty="0"/>
-              <a:t>Treffergenauigkeit mit goldenem Datensatz</a:t>
+            <a:pPr marL="342900" indent="-342900">
+              <a:buFont typeface="Arial" panose="020B0604020202020204" pitchFamily="34" charset="0"/>
+              <a:buChar char="•"/>
+            </a:pPr>
+            <a:r>
+              <a:rPr lang="de-DE" dirty="0"/>
+              <a:t>Fast die Hälfte der falsch Klassifizierten Daten hatten keinen </a:t>
+            </a:r>
+            <a:r>
+              <a:rPr lang="de-DE" dirty="0" err="1"/>
+              <a:t>zWarning-Flag</a:t>
+            </a:r>
+            <a:r>
+              <a:rPr lang="de-DE" dirty="0"/>
+              <a:t> = 0</a:t>
+            </a:r>
+          </a:p>
+          <a:p>
+            <a:pPr marL="342900" indent="-342900">
+              <a:buFont typeface="Arial" panose="020B0604020202020204" pitchFamily="34" charset="0"/>
+              <a:buChar char="•"/>
+            </a:pPr>
+            <a:endParaRPr lang="de-DE" dirty="0"/>
+          </a:p>
+          <a:p>
+            <a:pPr marL="342900" indent="-342900">
+              <a:buFont typeface="Arial" panose="020B0604020202020204" pitchFamily="34" charset="0"/>
+              <a:buChar char="•"/>
+            </a:pPr>
+            <a:r>
+              <a:rPr lang="de-DE" dirty="0"/>
+              <a:t>Neuer goldener Datensatz mit ausschließlich Spektren mit </a:t>
+            </a:r>
+            <a:r>
+              <a:rPr lang="de-DE" dirty="0" err="1"/>
+              <a:t>zWarning-Flag</a:t>
+            </a:r>
+            <a:r>
+              <a:rPr lang="de-DE" dirty="0"/>
+              <a:t> = 0 in SQL-Suche</a:t>
+            </a:r>
+          </a:p>
+          <a:p>
+            <a:pPr marL="342900" indent="-342900">
+              <a:buFont typeface="Arial" panose="020B0604020202020204" pitchFamily="34" charset="0"/>
+              <a:buChar char="•"/>
+            </a:pPr>
+            <a:endParaRPr lang="de-DE" dirty="0"/>
+          </a:p>
+          <a:p>
+            <a:pPr marL="342900" indent="-342900">
+              <a:buFont typeface="Arial" panose="020B0604020202020204" pitchFamily="34" charset="0"/>
+              <a:buChar char="•"/>
+            </a:pPr>
+            <a:r>
+              <a:rPr lang="de-DE" dirty="0"/>
+              <a:t>Verbessert Training deutlich!</a:t>
             </a:r>
           </a:p>
         </p:txBody>
@@ -21779,7 +21920,7 @@
           <p:cNvPr id="5" name="Titel 4">
             <a:extLst>
               <a:ext uri="{FF2B5EF4-FFF2-40B4-BE49-F238E27FC236}">
-                <a16:creationId xmlns:a16="http://schemas.microsoft.com/office/drawing/2014/main" id="{1D99E427-1C74-424C-832F-DBCAE6932CBF}"/>
+                <a16:creationId xmlns:a16="http://schemas.microsoft.com/office/drawing/2014/main" id="{8685DC7A-C157-48AA-83CF-330F16936B1D}"/>
               </a:ext>
             </a:extLst>
           </p:cNvPr>
@@ -21820,7 +21961,7 @@
           <p:cNvPr id="6" name="Datumsplatzhalter 5">
             <a:extLst>
               <a:ext uri="{FF2B5EF4-FFF2-40B4-BE49-F238E27FC236}">
-                <a16:creationId xmlns:a16="http://schemas.microsoft.com/office/drawing/2014/main" id="{9552BDD4-F2DB-4319-B540-8BCACAE779A2}"/>
+                <a16:creationId xmlns:a16="http://schemas.microsoft.com/office/drawing/2014/main" id="{1F9DFD61-43EB-4AA4-8660-90277BC9C9D5}"/>
               </a:ext>
             </a:extLst>
           </p:cNvPr>
@@ -21848,7 +21989,7 @@
           <p:cNvPr id="7" name="Fußzeilenplatzhalter 6">
             <a:extLst>
               <a:ext uri="{FF2B5EF4-FFF2-40B4-BE49-F238E27FC236}">
-                <a16:creationId xmlns:a16="http://schemas.microsoft.com/office/drawing/2014/main" id="{F13A4BCD-913F-4CB0-8181-C5283FEC32E0}"/>
+                <a16:creationId xmlns:a16="http://schemas.microsoft.com/office/drawing/2014/main" id="{264F4936-8E92-4713-8CB1-454BE208860A}"/>
               </a:ext>
             </a:extLst>
           </p:cNvPr>
@@ -21880,7 +22021,7 @@
           <p:cNvPr id="8" name="Foliennummernplatzhalter 7">
             <a:extLst>
               <a:ext uri="{FF2B5EF4-FFF2-40B4-BE49-F238E27FC236}">
-                <a16:creationId xmlns:a16="http://schemas.microsoft.com/office/drawing/2014/main" id="{FA904CFB-2619-412E-B716-C3E46BD93B59}"/>
+                <a16:creationId xmlns:a16="http://schemas.microsoft.com/office/drawing/2014/main" id="{F9BDED70-CC28-4881-95FC-093411DD3B55}"/>
               </a:ext>
             </a:extLst>
           </p:cNvPr>
@@ -21908,7 +22049,7 @@
     </p:spTree>
     <p:extLst>
       <p:ext uri="{BB962C8B-B14F-4D97-AF65-F5344CB8AC3E}">
-        <p14:creationId xmlns:p14="http://schemas.microsoft.com/office/powerpoint/2010/main" val="2659894904"/>
+        <p14:creationId xmlns:p14="http://schemas.microsoft.com/office/powerpoint/2010/main" val="1302608309"/>
       </p:ext>
     </p:extLst>
   </p:cSld>
@@ -21935,36 +22076,6 @@
           <a:chExt cx="0" cy="0"/>
         </a:xfrm>
       </p:grpSpPr>
-      <p:pic>
-        <p:nvPicPr>
-          <p:cNvPr id="4" name="Grafik 3">
-            <a:extLst>
-              <a:ext uri="{FF2B5EF4-FFF2-40B4-BE49-F238E27FC236}">
-                <a16:creationId xmlns:a16="http://schemas.microsoft.com/office/drawing/2014/main" id="{FEB291F6-C463-4918-9576-AFC6615B8B21}"/>
-              </a:ext>
-            </a:extLst>
-          </p:cNvPr>
-          <p:cNvPicPr>
-            <a:picLocks noChangeAspect="1"/>
-          </p:cNvPicPr>
-          <p:nvPr/>
-        </p:nvPicPr>
-        <p:blipFill>
-          <a:blip r:embed="rId2"/>
-          <a:stretch>
-            <a:fillRect/>
-          </a:stretch>
-        </p:blipFill>
-        <p:spPr>
-          <a:xfrm>
-            <a:off x="1907705" y="1566025"/>
-            <a:ext cx="5149158" cy="3490571"/>
-          </a:xfrm>
-          <a:prstGeom prst="rect">
-            <a:avLst/>
-          </a:prstGeom>
-        </p:spPr>
-      </p:pic>
       <p:sp>
         <p:nvSpPr>
           <p:cNvPr id="2" name="Textplatzhalter 1">
@@ -21993,7 +22104,7 @@
           <a:p>
             <a:r>
               <a:rPr lang="de-DE" dirty="0"/>
-              <a:t>Loss-Funktion mit goldenem Datensatz</a:t>
+              <a:t>Treffergenauigkeit mit goldenem Datensatz</a:t>
             </a:r>
           </a:p>
         </p:txBody>
@@ -22129,10 +22240,57 @@
           </a:p>
         </p:txBody>
       </p:sp>
+      <p:pic>
+        <p:nvPicPr>
+          <p:cNvPr id="3074" name="Picture 2">
+            <a:extLst>
+              <a:ext uri="{FF2B5EF4-FFF2-40B4-BE49-F238E27FC236}">
+                <a16:creationId xmlns:a16="http://schemas.microsoft.com/office/drawing/2014/main" id="{6DDF8D29-E5A0-4EEB-BB55-22659D94A6CF}"/>
+              </a:ext>
+            </a:extLst>
+          </p:cNvPr>
+          <p:cNvPicPr>
+            <a:picLocks noChangeAspect="1" noChangeArrowheads="1"/>
+          </p:cNvPicPr>
+          <p:nvPr/>
+        </p:nvPicPr>
+        <p:blipFill>
+          <a:blip r:embed="rId2">
+            <a:extLst>
+              <a:ext uri="{28A0092B-C50C-407E-A947-70E740481C1C}">
+                <a14:useLocalDpi xmlns:a14="http://schemas.microsoft.com/office/drawing/2010/main" val="0"/>
+              </a:ext>
+            </a:extLst>
+          </a:blip>
+          <a:srcRect/>
+          <a:stretch>
+            <a:fillRect/>
+          </a:stretch>
+        </p:blipFill>
+        <p:spPr bwMode="auto">
+          <a:xfrm>
+            <a:off x="1276450" y="1494362"/>
+            <a:ext cx="4794203" cy="3452820"/>
+          </a:xfrm>
+          <a:prstGeom prst="rect">
+            <a:avLst/>
+          </a:prstGeom>
+          <a:noFill/>
+          <a:extLst>
+            <a:ext uri="{909E8E84-426E-40DD-AFC4-6F175D3DCCD1}">
+              <a14:hiddenFill xmlns:a14="http://schemas.microsoft.com/office/drawing/2010/main">
+                <a:solidFill>
+                  <a:srgbClr val="FFFFFF"/>
+                </a:solidFill>
+              </a14:hiddenFill>
+            </a:ext>
+          </a:extLst>
+        </p:spPr>
+      </p:pic>
     </p:spTree>
     <p:extLst>
       <p:ext uri="{BB962C8B-B14F-4D97-AF65-F5344CB8AC3E}">
-        <p14:creationId xmlns:p14="http://schemas.microsoft.com/office/powerpoint/2010/main" val="1764681451"/>
+        <p14:creationId xmlns:p14="http://schemas.microsoft.com/office/powerpoint/2010/main" val="2659894904"/>
       </p:ext>
     </p:extLst>
   </p:cSld>
@@ -22161,18 +22319,92 @@
       </p:grpSpPr>
       <p:sp>
         <p:nvSpPr>
-          <p:cNvPr id="5" name="Datumsplatzhalter 4">
-            <a:extLst>
-              <a:ext uri="{FF2B5EF4-FFF2-40B4-BE49-F238E27FC236}">
-                <a16:creationId xmlns:a16="http://schemas.microsoft.com/office/drawing/2014/main" id="{87D681EC-FCA2-476F-BDF6-63ACE620651F}"/>
-              </a:ext>
-            </a:extLst>
-          </p:cNvPr>
-          <p:cNvSpPr>
-            <a:spLocks noGrp="1"/>
-          </p:cNvSpPr>
-          <p:nvPr>
-            <p:ph type="dt" sz="half" idx="12"/>
+          <p:cNvPr id="2" name="Textplatzhalter 1">
+            <a:extLst>
+              <a:ext uri="{FF2B5EF4-FFF2-40B4-BE49-F238E27FC236}">
+                <a16:creationId xmlns:a16="http://schemas.microsoft.com/office/drawing/2014/main" id="{23898163-0C45-43FD-AA1B-70702E754DCF}"/>
+              </a:ext>
+            </a:extLst>
+          </p:cNvPr>
+          <p:cNvSpPr>
+            <a:spLocks noGrp="1"/>
+          </p:cNvSpPr>
+          <p:nvPr>
+            <p:ph type="body" sz="quarter" idx="13"/>
+          </p:nvPr>
+        </p:nvSpPr>
+        <p:spPr>
+          <a:xfrm>
+            <a:off x="214769" y="1040897"/>
+            <a:ext cx="8353425" cy="503882"/>
+          </a:xfrm>
+        </p:spPr>
+        <p:txBody>
+          <a:bodyPr/>
+          <a:lstStyle/>
+          <a:p>
+            <a:r>
+              <a:rPr lang="de-DE" dirty="0"/>
+              <a:t>Loss-Funktion mit goldenem Datensatz</a:t>
+            </a:r>
+          </a:p>
+        </p:txBody>
+      </p:sp>
+      <p:sp>
+        <p:nvSpPr>
+          <p:cNvPr id="5" name="Titel 4">
+            <a:extLst>
+              <a:ext uri="{FF2B5EF4-FFF2-40B4-BE49-F238E27FC236}">
+                <a16:creationId xmlns:a16="http://schemas.microsoft.com/office/drawing/2014/main" id="{1D99E427-1C74-424C-832F-DBCAE6932CBF}"/>
+              </a:ext>
+            </a:extLst>
+          </p:cNvPr>
+          <p:cNvSpPr>
+            <a:spLocks noGrp="1"/>
+          </p:cNvSpPr>
+          <p:nvPr>
+            <p:ph type="title"/>
+          </p:nvPr>
+        </p:nvSpPr>
+        <p:spPr/>
+        <p:txBody>
+          <a:bodyPr/>
+          <a:lstStyle/>
+          <a:p>
+            <a:r>
+              <a:rPr lang="de-DE" dirty="0"/>
+              <a:t>Klassifizierung von </a:t>
+            </a:r>
+            <a:r>
+              <a:rPr lang="de-DE" dirty="0" err="1"/>
+              <a:t>sdss</a:t>
+            </a:r>
+            <a:r>
+              <a:rPr lang="de-DE" dirty="0"/>
+              <a:t> </a:t>
+            </a:r>
+            <a:r>
+              <a:rPr lang="de-DE" dirty="0" err="1"/>
+              <a:t>spektraldaten</a:t>
+            </a:r>
+            <a:endParaRPr lang="de-DE" dirty="0"/>
+          </a:p>
+        </p:txBody>
+      </p:sp>
+      <p:sp>
+        <p:nvSpPr>
+          <p:cNvPr id="6" name="Datumsplatzhalter 5">
+            <a:extLst>
+              <a:ext uri="{FF2B5EF4-FFF2-40B4-BE49-F238E27FC236}">
+                <a16:creationId xmlns:a16="http://schemas.microsoft.com/office/drawing/2014/main" id="{9552BDD4-F2DB-4319-B540-8BCACAE779A2}"/>
+              </a:ext>
+            </a:extLst>
+          </p:cNvPr>
+          <p:cNvSpPr>
+            <a:spLocks noGrp="1"/>
+          </p:cNvSpPr>
+          <p:nvPr>
+            <p:ph type="dt" sz="half" idx="17"/>
           </p:nvPr>
         </p:nvSpPr>
         <p:spPr/>
@@ -22187,69 +22419,74 @@
           </a:p>
         </p:txBody>
       </p:sp>
+      <p:sp>
+        <p:nvSpPr>
+          <p:cNvPr id="7" name="Fußzeilenplatzhalter 6">
+            <a:extLst>
+              <a:ext uri="{FF2B5EF4-FFF2-40B4-BE49-F238E27FC236}">
+                <a16:creationId xmlns:a16="http://schemas.microsoft.com/office/drawing/2014/main" id="{F13A4BCD-913F-4CB0-8181-C5283FEC32E0}"/>
+              </a:ext>
+            </a:extLst>
+          </p:cNvPr>
+          <p:cNvSpPr>
+            <a:spLocks noGrp="1"/>
+          </p:cNvSpPr>
+          <p:nvPr>
+            <p:ph type="ftr" sz="quarter" idx="18"/>
+          </p:nvPr>
+        </p:nvSpPr>
+        <p:spPr/>
+        <p:txBody>
+          <a:bodyPr/>
+          <a:lstStyle/>
+          <a:p>
+            <a:r>
+              <a:rPr lang="de-DE" dirty="0">
+                <a:latin typeface="TheSans UHH Bold Caps"/>
+                <a:cs typeface="TheSans UHH Bold Caps"/>
+              </a:rPr>
+              <a:t>Machine Learning</a:t>
+            </a:r>
+            <a:endParaRPr lang="de-DE" dirty="0"/>
+          </a:p>
+        </p:txBody>
+      </p:sp>
+      <p:sp>
+        <p:nvSpPr>
+          <p:cNvPr id="8" name="Foliennummernplatzhalter 7">
+            <a:extLst>
+              <a:ext uri="{FF2B5EF4-FFF2-40B4-BE49-F238E27FC236}">
+                <a16:creationId xmlns:a16="http://schemas.microsoft.com/office/drawing/2014/main" id="{FA904CFB-2619-412E-B716-C3E46BD93B59}"/>
+              </a:ext>
+            </a:extLst>
+          </p:cNvPr>
+          <p:cNvSpPr>
+            <a:spLocks noGrp="1"/>
+          </p:cNvSpPr>
+          <p:nvPr>
+            <p:ph type="sldNum" sz="quarter" idx="19"/>
+          </p:nvPr>
+        </p:nvSpPr>
+        <p:spPr/>
+        <p:txBody>
+          <a:bodyPr/>
+          <a:lstStyle/>
+          <a:p>
+            <a:fld id="{3E01A2B2-10AD-754B-9B4C-E5B6FED423D0}" type="slidenum">
+              <a:rPr lang="de-DE" smtClean="0"/>
+              <a:pPr/>
+              <a:t>62</a:t>
+            </a:fld>
+            <a:endParaRPr lang="de-DE"/>
+          </a:p>
+        </p:txBody>
+      </p:sp>
       <p:pic>
         <p:nvPicPr>
-          <p:cNvPr id="8" name="Grafik 7">
-            <a:extLst>
-              <a:ext uri="{FF2B5EF4-FFF2-40B4-BE49-F238E27FC236}">
-                <a16:creationId xmlns:a16="http://schemas.microsoft.com/office/drawing/2014/main" id="{5AFC54F5-B025-4D77-B695-33430F8D47CD}"/>
-              </a:ext>
-            </a:extLst>
-          </p:cNvPr>
-          <p:cNvPicPr>
-            <a:picLocks noChangeAspect="1"/>
-          </p:cNvPicPr>
-          <p:nvPr/>
-        </p:nvPicPr>
-        <p:blipFill rotWithShape="1">
-          <a:blip r:embed="rId2"/>
-          <a:srcRect l="7294" t="10569" r="7903" b="5751"/>
-          <a:stretch/>
-        </p:blipFill>
-        <p:spPr>
-          <a:xfrm>
-            <a:off x="2489491" y="943443"/>
-            <a:ext cx="2830282" cy="1861914"/>
-          </a:xfrm>
-          <a:prstGeom prst="rect">
-            <a:avLst/>
-          </a:prstGeom>
-        </p:spPr>
-      </p:pic>
-      <p:pic>
-        <p:nvPicPr>
-          <p:cNvPr id="9" name="Bildplatzhalter 15">
-            <a:extLst>
-              <a:ext uri="{FF2B5EF4-FFF2-40B4-BE49-F238E27FC236}">
-                <a16:creationId xmlns:a16="http://schemas.microsoft.com/office/drawing/2014/main" id="{3A785DB0-D1D4-46BB-9360-0D0C7CF138F0}"/>
-              </a:ext>
-            </a:extLst>
-          </p:cNvPr>
-          <p:cNvPicPr>
-            <a:picLocks noGrp="1" noChangeAspect="1"/>
-          </p:cNvPicPr>
-          <p:nvPr>
-            <p:ph type="pic" sz="quarter" idx="10"/>
-          </p:nvPr>
-        </p:nvPicPr>
-        <p:blipFill rotWithShape="1">
-          <a:blip r:embed="rId3"/>
-          <a:srcRect l="7580" t="-791" r="11221" b="8830"/>
-          <a:stretch/>
-        </p:blipFill>
-        <p:spPr>
-          <a:xfrm>
-            <a:off x="327972" y="905992"/>
-            <a:ext cx="1985991" cy="1869168"/>
-          </a:xfrm>
-        </p:spPr>
-      </p:pic>
-      <p:pic>
-        <p:nvPicPr>
-          <p:cNvPr id="10" name="Picture 2">
-            <a:extLst>
-              <a:ext uri="{FF2B5EF4-FFF2-40B4-BE49-F238E27FC236}">
-                <a16:creationId xmlns:a16="http://schemas.microsoft.com/office/drawing/2014/main" id="{2118F744-F451-4A53-8B95-3C905FCA0931}"/>
+          <p:cNvPr id="2052" name="Picture 4">
+            <a:extLst>
+              <a:ext uri="{FF2B5EF4-FFF2-40B4-BE49-F238E27FC236}">
+                <a16:creationId xmlns:a16="http://schemas.microsoft.com/office/drawing/2014/main" id="{182B047C-53BF-448B-8FDB-D6C06A38E3F1}"/>
               </a:ext>
             </a:extLst>
           </p:cNvPr>
@@ -22258,21 +22495,23 @@
           </p:cNvPicPr>
           <p:nvPr/>
         </p:nvPicPr>
-        <p:blipFill rotWithShape="1">
-          <a:blip r:embed="rId4">
+        <p:blipFill>
+          <a:blip r:embed="rId2">
             <a:extLst>
               <a:ext uri="{28A0092B-C50C-407E-A947-70E740481C1C}">
                 <a14:useLocalDpi xmlns:a14="http://schemas.microsoft.com/office/drawing/2010/main" val="0"/>
               </a:ext>
             </a:extLst>
           </a:blip>
-          <a:srcRect l="5641" t="6800" b="8416"/>
-          <a:stretch/>
+          <a:srcRect/>
+          <a:stretch>
+            <a:fillRect/>
+          </a:stretch>
         </p:blipFill>
         <p:spPr bwMode="auto">
           <a:xfrm>
-            <a:off x="3436698" y="3082301"/>
-            <a:ext cx="2841911" cy="1861914"/>
+            <a:off x="1115616" y="1396488"/>
+            <a:ext cx="5023403" cy="3544432"/>
           </a:xfrm>
           <a:prstGeom prst="rect">
             <a:avLst/>
@@ -22289,6 +22528,121 @@
           </a:extLst>
         </p:spPr>
       </p:pic>
+    </p:spTree>
+    <p:extLst>
+      <p:ext uri="{BB962C8B-B14F-4D97-AF65-F5344CB8AC3E}">
+        <p14:creationId xmlns:p14="http://schemas.microsoft.com/office/powerpoint/2010/main" val="1764681451"/>
+      </p:ext>
+    </p:extLst>
+  </p:cSld>
+  <p:clrMapOvr>
+    <a:masterClrMapping/>
+  </p:clrMapOvr>
+</p:sld>
+</file>
+
+<file path=ppt/slides/slide63.xml><?xml version="1.0" encoding="utf-8"?>
+<p:sld xmlns:a="http://schemas.openxmlformats.org/drawingml/2006/main" xmlns:r="http://schemas.openxmlformats.org/officeDocument/2006/relationships" xmlns:p="http://schemas.openxmlformats.org/presentationml/2006/main">
+  <p:cSld>
+    <p:spTree>
+      <p:nvGrpSpPr>
+        <p:cNvPr id="1" name=""/>
+        <p:cNvGrpSpPr/>
+        <p:nvPr/>
+      </p:nvGrpSpPr>
+      <p:grpSpPr>
+        <a:xfrm>
+          <a:off x="0" y="0"/>
+          <a:ext cx="0" cy="0"/>
+          <a:chOff x="0" y="0"/>
+          <a:chExt cx="0" cy="0"/>
+        </a:xfrm>
+      </p:grpSpPr>
+      <p:sp>
+        <p:nvSpPr>
+          <p:cNvPr id="5" name="Datumsplatzhalter 4">
+            <a:extLst>
+              <a:ext uri="{FF2B5EF4-FFF2-40B4-BE49-F238E27FC236}">
+                <a16:creationId xmlns:a16="http://schemas.microsoft.com/office/drawing/2014/main" id="{87D681EC-FCA2-476F-BDF6-63ACE620651F}"/>
+              </a:ext>
+            </a:extLst>
+          </p:cNvPr>
+          <p:cNvSpPr>
+            <a:spLocks noGrp="1"/>
+          </p:cNvSpPr>
+          <p:nvPr>
+            <p:ph type="dt" sz="half" idx="12"/>
+          </p:nvPr>
+        </p:nvSpPr>
+        <p:spPr/>
+        <p:txBody>
+          <a:bodyPr/>
+          <a:lstStyle/>
+          <a:p>
+            <a:r>
+              <a:rPr lang="de-DE"/>
+              <a:t>24.08.2021</a:t>
+            </a:r>
+          </a:p>
+        </p:txBody>
+      </p:sp>
+      <p:pic>
+        <p:nvPicPr>
+          <p:cNvPr id="8" name="Grafik 7">
+            <a:extLst>
+              <a:ext uri="{FF2B5EF4-FFF2-40B4-BE49-F238E27FC236}">
+                <a16:creationId xmlns:a16="http://schemas.microsoft.com/office/drawing/2014/main" id="{5AFC54F5-B025-4D77-B695-33430F8D47CD}"/>
+              </a:ext>
+            </a:extLst>
+          </p:cNvPr>
+          <p:cNvPicPr>
+            <a:picLocks noChangeAspect="1"/>
+          </p:cNvPicPr>
+          <p:nvPr/>
+        </p:nvPicPr>
+        <p:blipFill rotWithShape="1">
+          <a:blip r:embed="rId2"/>
+          <a:srcRect l="7294" t="10569" r="7903" b="5751"/>
+          <a:stretch/>
+        </p:blipFill>
+        <p:spPr>
+          <a:xfrm>
+            <a:off x="6084168" y="195486"/>
+            <a:ext cx="2830282" cy="1861914"/>
+          </a:xfrm>
+          <a:prstGeom prst="rect">
+            <a:avLst/>
+          </a:prstGeom>
+        </p:spPr>
+      </p:pic>
+      <p:pic>
+        <p:nvPicPr>
+          <p:cNvPr id="9" name="Bildplatzhalter 15">
+            <a:extLst>
+              <a:ext uri="{FF2B5EF4-FFF2-40B4-BE49-F238E27FC236}">
+                <a16:creationId xmlns:a16="http://schemas.microsoft.com/office/drawing/2014/main" id="{3A785DB0-D1D4-46BB-9360-0D0C7CF138F0}"/>
+              </a:ext>
+            </a:extLst>
+          </p:cNvPr>
+          <p:cNvPicPr>
+            <a:picLocks noGrp="1" noChangeAspect="1"/>
+          </p:cNvPicPr>
+          <p:nvPr>
+            <p:ph type="pic" sz="quarter" idx="10"/>
+          </p:nvPr>
+        </p:nvPicPr>
+        <p:blipFill rotWithShape="1">
+          <a:blip r:embed="rId3"/>
+          <a:srcRect l="7580" t="-791" r="11221" b="8830"/>
+          <a:stretch/>
+        </p:blipFill>
+        <p:spPr>
+          <a:xfrm>
+            <a:off x="229550" y="155154"/>
+            <a:ext cx="1985991" cy="1869168"/>
+          </a:xfrm>
+        </p:spPr>
+      </p:pic>
       <p:sp>
         <p:nvSpPr>
           <p:cNvPr id="12" name="Textfeld 11">
@@ -22303,7 +22657,7 @@
         </p:nvSpPr>
         <p:spPr>
           <a:xfrm>
-            <a:off x="2888686" y="149152"/>
+            <a:off x="2852682" y="2148346"/>
             <a:ext cx="3366627" cy="584775"/>
           </a:xfrm>
           <a:prstGeom prst="rect">
@@ -22340,8 +22694,8 @@
         </p:nvSpPr>
         <p:spPr>
           <a:xfrm>
-            <a:off x="6138307" y="1382672"/>
-            <a:ext cx="2677721" cy="830997"/>
+            <a:off x="3779912" y="600219"/>
+            <a:ext cx="1512168" cy="830997"/>
           </a:xfrm>
           <a:prstGeom prst="rect">
             <a:avLst/>
@@ -22355,16 +22709,10 @@
           <a:lstStyle/>
           <a:p>
             <a:r>
-              <a:rPr lang="de-DE" sz="2400" dirty="0">
-                <a:latin typeface="TheSans UHH" panose="020B0502050302020203" pitchFamily="34" charset="0"/>
-              </a:rPr>
-              <a:t>Learning </a:t>
-            </a:r>
-            <a:r>
               <a:rPr lang="de-DE" sz="2400" dirty="0" err="1">
                 <a:latin typeface="TheSans UHH" panose="020B0502050302020203" pitchFamily="34" charset="0"/>
               </a:rPr>
-              <a:t>the</a:t>
+              <a:t>How</a:t>
             </a:r>
             <a:r>
               <a:rPr lang="de-DE" sz="2400" dirty="0">
@@ -22376,19 +22724,18 @@
               <a:rPr lang="de-DE" sz="2400" dirty="0" err="1">
                 <a:latin typeface="TheSans UHH" panose="020B0502050302020203" pitchFamily="34" charset="0"/>
               </a:rPr>
-              <a:t>basics</a:t>
-            </a:r>
-            <a:r>
-              <a:rPr lang="de-DE" sz="2400" dirty="0">
-                <a:latin typeface="TheSans UHH" panose="020B0502050302020203" pitchFamily="34" charset="0"/>
-              </a:rPr>
-              <a:t> </a:t>
-            </a:r>
+              <a:t>to</a:t>
+            </a:r>
+            <a:endParaRPr lang="de-DE" sz="2400" dirty="0">
+              <a:latin typeface="TheSans UHH" panose="020B0502050302020203" pitchFamily="34" charset="0"/>
+            </a:endParaRPr>
+          </a:p>
+          <a:p>
             <a:r>
               <a:rPr lang="de-DE" sz="2400" dirty="0" err="1">
                 <a:latin typeface="TheSans UHH" panose="020B0502050302020203" pitchFamily="34" charset="0"/>
               </a:rPr>
-              <a:t>of</a:t>
+              <a:t>use</a:t>
             </a:r>
             <a:r>
               <a:rPr lang="de-DE" sz="2400" dirty="0">
@@ -22492,7 +22839,7 @@
         </p:nvSpPr>
         <p:spPr>
           <a:xfrm>
-            <a:off x="6783461" y="3807505"/>
+            <a:off x="6783461" y="3973001"/>
             <a:ext cx="2467240" cy="830997"/>
           </a:xfrm>
           <a:prstGeom prst="rect">
@@ -22550,8 +22897,8 @@
         </p:nvSpPr>
         <p:spPr>
           <a:xfrm>
-            <a:off x="5586994" y="1228129"/>
-            <a:ext cx="614272" cy="1107996"/>
+            <a:off x="3228599" y="445676"/>
+            <a:ext cx="444818" cy="1107996"/>
           </a:xfrm>
           <a:prstGeom prst="rect">
             <a:avLst/>
@@ -22559,7 +22906,7 @@
           <a:noFill/>
         </p:spPr>
         <p:txBody>
-          <a:bodyPr wrap="none" lIns="91440" tIns="45720" rIns="91440" bIns="45720">
+          <a:bodyPr wrap="square" lIns="91440" tIns="45720" rIns="91440" bIns="45720">
             <a:spAutoFit/>
           </a:bodyPr>
           <a:lstStyle/>
@@ -22669,7 +23016,7 @@
         </p:nvSpPr>
         <p:spPr>
           <a:xfrm>
-            <a:off x="6247949" y="3621236"/>
+            <a:off x="6247949" y="3786732"/>
             <a:ext cx="614272" cy="1107996"/>
           </a:xfrm>
           <a:prstGeom prst="rect">
@@ -22728,18 +23075,63 @@
           <p:nvPr/>
         </p:nvPicPr>
         <p:blipFill rotWithShape="1">
-          <a:blip r:embed="rId5"/>
+          <a:blip r:embed="rId4"/>
           <a:srcRect l="44179" r="527"/>
           <a:stretch/>
         </p:blipFill>
         <p:spPr>
           <a:xfrm>
-            <a:off x="330002" y="3887421"/>
+            <a:off x="311326" y="3891660"/>
             <a:ext cx="2478628" cy="1120657"/>
           </a:xfrm>
           <a:prstGeom prst="rect">
             <a:avLst/>
           </a:prstGeom>
+        </p:spPr>
+      </p:pic>
+      <p:pic>
+        <p:nvPicPr>
+          <p:cNvPr id="22" name="Picture 4">
+            <a:extLst>
+              <a:ext uri="{FF2B5EF4-FFF2-40B4-BE49-F238E27FC236}">
+                <a16:creationId xmlns:a16="http://schemas.microsoft.com/office/drawing/2014/main" id="{78F787BF-0238-47C7-AB45-2A8D2BDBDB4E}"/>
+              </a:ext>
+            </a:extLst>
+          </p:cNvPr>
+          <p:cNvPicPr>
+            <a:picLocks noChangeAspect="1" noChangeArrowheads="1"/>
+          </p:cNvPicPr>
+          <p:nvPr/>
+        </p:nvPicPr>
+        <p:blipFill rotWithShape="1">
+          <a:blip r:embed="rId5">
+            <a:extLst>
+              <a:ext uri="{28A0092B-C50C-407E-A947-70E740481C1C}">
+                <a14:useLocalDpi xmlns:a14="http://schemas.microsoft.com/office/drawing/2010/main" val="0"/>
+              </a:ext>
+            </a:extLst>
+          </a:blip>
+          <a:srcRect l="6256" t="7642" b="11891"/>
+          <a:stretch/>
+        </p:blipFill>
+        <p:spPr bwMode="auto">
+          <a:xfrm>
+            <a:off x="3038021" y="3048187"/>
+            <a:ext cx="3265792" cy="1997241"/>
+          </a:xfrm>
+          <a:prstGeom prst="rect">
+            <a:avLst/>
+          </a:prstGeom>
+          <a:noFill/>
+          <a:extLst>
+            <a:ext uri="{909E8E84-426E-40DD-AFC4-6F175D3DCCD1}">
+              <a14:hiddenFill xmlns:a14="http://schemas.microsoft.com/office/drawing/2010/main">
+                <a:solidFill>
+                  <a:srgbClr val="FFFFFF"/>
+                </a:solidFill>
+              </a14:hiddenFill>
+            </a:ext>
+          </a:extLst>
         </p:spPr>
       </p:pic>
     </p:spTree>

</xml_diff>